<commit_message>
new figures and cleaning
</commit_message>
<xml_diff>
--- a/figures/flowchart.pptx
+++ b/figures/flowchart.pptx
@@ -2,18 +2,18 @@
 <file path=ppt/presentation.xml><?xml version="1.0" encoding="utf-8"?>
 <p:presentation xmlns:a="http://schemas.openxmlformats.org/drawingml/2006/main" xmlns:r="http://schemas.openxmlformats.org/officeDocument/2006/relationships" xmlns:p="http://schemas.openxmlformats.org/presentationml/2006/main" saveSubsetFonts="1" autoCompressPictures="0">
   <p:sldMasterIdLst>
-    <p:sldMasterId id="2147483696" r:id="rId1"/>
+    <p:sldMasterId id="2147483756" r:id="rId1"/>
   </p:sldMasterIdLst>
   <p:sldIdLst>
     <p:sldId id="256" r:id="rId2"/>
   </p:sldIdLst>
-  <p:sldSz cx="6858000" cy="9683750"/>
+  <p:sldSz cx="9144000" cy="12192000"/>
   <p:notesSz cx="6858000" cy="9144000"/>
   <p:defaultTextStyle>
     <a:defPPr>
       <a:defRPr lang="en-US"/>
     </a:defPPr>
-    <a:lvl1pPr marL="0" algn="l" defTabSz="914400" rtl="0" eaLnBrk="1" latinLnBrk="0" hangingPunct="1">
+    <a:lvl1pPr marL="0" algn="l" defTabSz="457200" rtl="0" eaLnBrk="1" latinLnBrk="0" hangingPunct="1">
       <a:defRPr sz="1800" kern="1200">
         <a:solidFill>
           <a:schemeClr val="tx1"/>
@@ -23,7 +23,7 @@
         <a:cs typeface="+mn-cs"/>
       </a:defRPr>
     </a:lvl1pPr>
-    <a:lvl2pPr marL="457200" algn="l" defTabSz="914400" rtl="0" eaLnBrk="1" latinLnBrk="0" hangingPunct="1">
+    <a:lvl2pPr marL="457200" algn="l" defTabSz="457200" rtl="0" eaLnBrk="1" latinLnBrk="0" hangingPunct="1">
       <a:defRPr sz="1800" kern="1200">
         <a:solidFill>
           <a:schemeClr val="tx1"/>
@@ -33,7 +33,7 @@
         <a:cs typeface="+mn-cs"/>
       </a:defRPr>
     </a:lvl2pPr>
-    <a:lvl3pPr marL="914400" algn="l" defTabSz="914400" rtl="0" eaLnBrk="1" latinLnBrk="0" hangingPunct="1">
+    <a:lvl3pPr marL="914400" algn="l" defTabSz="457200" rtl="0" eaLnBrk="1" latinLnBrk="0" hangingPunct="1">
       <a:defRPr sz="1800" kern="1200">
         <a:solidFill>
           <a:schemeClr val="tx1"/>
@@ -43,7 +43,7 @@
         <a:cs typeface="+mn-cs"/>
       </a:defRPr>
     </a:lvl3pPr>
-    <a:lvl4pPr marL="1371600" algn="l" defTabSz="914400" rtl="0" eaLnBrk="1" latinLnBrk="0" hangingPunct="1">
+    <a:lvl4pPr marL="1371600" algn="l" defTabSz="457200" rtl="0" eaLnBrk="1" latinLnBrk="0" hangingPunct="1">
       <a:defRPr sz="1800" kern="1200">
         <a:solidFill>
           <a:schemeClr val="tx1"/>
@@ -53,7 +53,7 @@
         <a:cs typeface="+mn-cs"/>
       </a:defRPr>
     </a:lvl4pPr>
-    <a:lvl5pPr marL="1828800" algn="l" defTabSz="914400" rtl="0" eaLnBrk="1" latinLnBrk="0" hangingPunct="1">
+    <a:lvl5pPr marL="1828800" algn="l" defTabSz="457200" rtl="0" eaLnBrk="1" latinLnBrk="0" hangingPunct="1">
       <a:defRPr sz="1800" kern="1200">
         <a:solidFill>
           <a:schemeClr val="tx1"/>
@@ -63,7 +63,7 @@
         <a:cs typeface="+mn-cs"/>
       </a:defRPr>
     </a:lvl5pPr>
-    <a:lvl6pPr marL="2286000" algn="l" defTabSz="914400" rtl="0" eaLnBrk="1" latinLnBrk="0" hangingPunct="1">
+    <a:lvl6pPr marL="2286000" algn="l" defTabSz="457200" rtl="0" eaLnBrk="1" latinLnBrk="0" hangingPunct="1">
       <a:defRPr sz="1800" kern="1200">
         <a:solidFill>
           <a:schemeClr val="tx1"/>
@@ -73,7 +73,7 @@
         <a:cs typeface="+mn-cs"/>
       </a:defRPr>
     </a:lvl6pPr>
-    <a:lvl7pPr marL="2743200" algn="l" defTabSz="914400" rtl="0" eaLnBrk="1" latinLnBrk="0" hangingPunct="1">
+    <a:lvl7pPr marL="2743200" algn="l" defTabSz="457200" rtl="0" eaLnBrk="1" latinLnBrk="0" hangingPunct="1">
       <a:defRPr sz="1800" kern="1200">
         <a:solidFill>
           <a:schemeClr val="tx1"/>
@@ -83,7 +83,7 @@
         <a:cs typeface="+mn-cs"/>
       </a:defRPr>
     </a:lvl7pPr>
-    <a:lvl8pPr marL="3200400" algn="l" defTabSz="914400" rtl="0" eaLnBrk="1" latinLnBrk="0" hangingPunct="1">
+    <a:lvl8pPr marL="3200400" algn="l" defTabSz="457200" rtl="0" eaLnBrk="1" latinLnBrk="0" hangingPunct="1">
       <a:defRPr sz="1800" kern="1200">
         <a:solidFill>
           <a:schemeClr val="tx1"/>
@@ -93,7 +93,7 @@
         <a:cs typeface="+mn-cs"/>
       </a:defRPr>
     </a:lvl8pPr>
-    <a:lvl9pPr marL="3657600" algn="l" defTabSz="914400" rtl="0" eaLnBrk="1" latinLnBrk="0" hangingPunct="1">
+    <a:lvl9pPr marL="3657600" algn="l" defTabSz="457200" rtl="0" eaLnBrk="1" latinLnBrk="0" hangingPunct="1">
       <a:defRPr sz="1800" kern="1200">
         <a:solidFill>
           <a:schemeClr val="tx1"/>
@@ -141,15 +141,15 @@
         </p:nvSpPr>
         <p:spPr>
           <a:xfrm>
-            <a:off x="514350" y="1584818"/>
-            <a:ext cx="5829300" cy="3371380"/>
+            <a:off x="685800" y="1995312"/>
+            <a:ext cx="7772400" cy="4244622"/>
           </a:xfrm>
         </p:spPr>
         <p:txBody>
           <a:bodyPr anchor="b"/>
           <a:lstStyle>
             <a:lvl1pPr algn="ctr">
-              <a:defRPr sz="4500"/>
+              <a:defRPr sz="6000"/>
             </a:lvl1pPr>
           </a:lstStyle>
           <a:p>
@@ -173,8 +173,8 @@
         </p:nvSpPr>
         <p:spPr>
           <a:xfrm>
-            <a:off x="857250" y="5086211"/>
-            <a:ext cx="5143500" cy="2337997"/>
+            <a:off x="1143000" y="6403623"/>
+            <a:ext cx="6858000" cy="2943577"/>
           </a:xfrm>
         </p:spPr>
         <p:txBody>
@@ -182,39 +182,39 @@
           <a:lstStyle>
             <a:lvl1pPr marL="0" indent="0" algn="ctr">
               <a:buNone/>
+              <a:defRPr sz="2400"/>
+            </a:lvl1pPr>
+            <a:lvl2pPr marL="457200" indent="0" algn="ctr">
+              <a:buNone/>
+              <a:defRPr sz="2000"/>
+            </a:lvl2pPr>
+            <a:lvl3pPr marL="914400" indent="0" algn="ctr">
+              <a:buNone/>
               <a:defRPr sz="1800"/>
-            </a:lvl1pPr>
-            <a:lvl2pPr marL="342900" indent="0" algn="ctr">
-              <a:buNone/>
-              <a:defRPr sz="1500"/>
-            </a:lvl2pPr>
-            <a:lvl3pPr marL="685800" indent="0" algn="ctr">
-              <a:buNone/>
-              <a:defRPr sz="1350"/>
             </a:lvl3pPr>
-            <a:lvl4pPr marL="1028700" indent="0" algn="ctr">
-              <a:buNone/>
-              <a:defRPr sz="1200"/>
+            <a:lvl4pPr marL="1371600" indent="0" algn="ctr">
+              <a:buNone/>
+              <a:defRPr sz="1600"/>
             </a:lvl4pPr>
-            <a:lvl5pPr marL="1371600" indent="0" algn="ctr">
-              <a:buNone/>
-              <a:defRPr sz="1200"/>
+            <a:lvl5pPr marL="1828800" indent="0" algn="ctr">
+              <a:buNone/>
+              <a:defRPr sz="1600"/>
             </a:lvl5pPr>
-            <a:lvl6pPr marL="1714500" indent="0" algn="ctr">
-              <a:buNone/>
-              <a:defRPr sz="1200"/>
+            <a:lvl6pPr marL="2286000" indent="0" algn="ctr">
+              <a:buNone/>
+              <a:defRPr sz="1600"/>
             </a:lvl6pPr>
-            <a:lvl7pPr marL="2057400" indent="0" algn="ctr">
-              <a:buNone/>
-              <a:defRPr sz="1200"/>
+            <a:lvl7pPr marL="2743200" indent="0" algn="ctr">
+              <a:buNone/>
+              <a:defRPr sz="1600"/>
             </a:lvl7pPr>
-            <a:lvl8pPr marL="2400300" indent="0" algn="ctr">
-              <a:buNone/>
-              <a:defRPr sz="1200"/>
+            <a:lvl8pPr marL="3200400" indent="0" algn="ctr">
+              <a:buNone/>
+              <a:defRPr sz="1600"/>
             </a:lvl8pPr>
-            <a:lvl9pPr marL="2743200" indent="0" algn="ctr">
-              <a:buNone/>
-              <a:defRPr sz="1200"/>
+            <a:lvl9pPr marL="3657600" indent="0" algn="ctr">
+              <a:buNone/>
+              <a:defRPr sz="1600"/>
             </a:lvl9pPr>
           </a:lstStyle>
           <a:p>
@@ -243,7 +243,7 @@
           <a:p>
             <a:fld id="{75631D6F-10A1-474F-A874-C81F1BE1340A}" type="datetimeFigureOut">
               <a:rPr lang="en-US" smtClean="0"/>
-              <a:t>3/24/23</a:t>
+              <a:t>7/18/24</a:t>
             </a:fld>
             <a:endParaRPr lang="en-US"/>
           </a:p>
@@ -294,7 +294,7 @@
     </p:spTree>
     <p:extLst>
       <p:ext uri="{BB962C8B-B14F-4D97-AF65-F5344CB8AC3E}">
-        <p14:creationId xmlns:p14="http://schemas.microsoft.com/office/powerpoint/2010/main" val="1734359243"/>
+        <p14:creationId xmlns:p14="http://schemas.microsoft.com/office/powerpoint/2010/main" val="2499699446"/>
       </p:ext>
     </p:extLst>
   </p:cSld>
@@ -362,7 +362,7 @@
             <a:pPr lvl="0"/>
             <a:r>
               <a:rPr lang="en-US"/>
-              <a:t>Edit Master text styles</a:t>
+              <a:t>Click to edit Master text styles</a:t>
             </a:r>
           </a:p>
           <a:p>
@@ -413,7 +413,7 @@
           <a:p>
             <a:fld id="{75631D6F-10A1-474F-A874-C81F1BE1340A}" type="datetimeFigureOut">
               <a:rPr lang="en-US" smtClean="0"/>
-              <a:t>3/24/23</a:t>
+              <a:t>7/18/24</a:t>
             </a:fld>
             <a:endParaRPr lang="en-US"/>
           </a:p>
@@ -464,7 +464,7 @@
     </p:spTree>
     <p:extLst>
       <p:ext uri="{BB962C8B-B14F-4D97-AF65-F5344CB8AC3E}">
-        <p14:creationId xmlns:p14="http://schemas.microsoft.com/office/powerpoint/2010/main" val="1851025808"/>
+        <p14:creationId xmlns:p14="http://schemas.microsoft.com/office/powerpoint/2010/main" val="2835200582"/>
       </p:ext>
     </p:extLst>
   </p:cSld>
@@ -503,8 +503,8 @@
         </p:nvSpPr>
         <p:spPr>
           <a:xfrm>
-            <a:off x="4907757" y="515570"/>
-            <a:ext cx="1478756" cy="8206531"/>
+            <a:off x="6543676" y="649111"/>
+            <a:ext cx="1971675" cy="10332156"/>
           </a:xfrm>
         </p:spPr>
         <p:txBody>
@@ -531,8 +531,8 @@
         </p:nvSpPr>
         <p:spPr>
           <a:xfrm>
-            <a:off x="471488" y="515570"/>
-            <a:ext cx="4350544" cy="8206531"/>
+            <a:off x="628651" y="649111"/>
+            <a:ext cx="5800725" cy="10332156"/>
           </a:xfrm>
         </p:spPr>
         <p:txBody>
@@ -542,7 +542,7 @@
             <a:pPr lvl="0"/>
             <a:r>
               <a:rPr lang="en-US"/>
-              <a:t>Edit Master text styles</a:t>
+              <a:t>Click to edit Master text styles</a:t>
             </a:r>
           </a:p>
           <a:p>
@@ -593,7 +593,7 @@
           <a:p>
             <a:fld id="{75631D6F-10A1-474F-A874-C81F1BE1340A}" type="datetimeFigureOut">
               <a:rPr lang="en-US" smtClean="0"/>
-              <a:t>3/24/23</a:t>
+              <a:t>7/18/24</a:t>
             </a:fld>
             <a:endParaRPr lang="en-US"/>
           </a:p>
@@ -644,7 +644,7 @@
     </p:spTree>
     <p:extLst>
       <p:ext uri="{BB962C8B-B14F-4D97-AF65-F5344CB8AC3E}">
-        <p14:creationId xmlns:p14="http://schemas.microsoft.com/office/powerpoint/2010/main" val="3535426622"/>
+        <p14:creationId xmlns:p14="http://schemas.microsoft.com/office/powerpoint/2010/main" val="3397179801"/>
       </p:ext>
     </p:extLst>
   </p:cSld>
@@ -712,7 +712,7 @@
             <a:pPr lvl="0"/>
             <a:r>
               <a:rPr lang="en-US"/>
-              <a:t>Edit Master text styles</a:t>
+              <a:t>Click to edit Master text styles</a:t>
             </a:r>
           </a:p>
           <a:p>
@@ -763,7 +763,7 @@
           <a:p>
             <a:fld id="{75631D6F-10A1-474F-A874-C81F1BE1340A}" type="datetimeFigureOut">
               <a:rPr lang="en-US" smtClean="0"/>
-              <a:t>3/24/23</a:t>
+              <a:t>7/18/24</a:t>
             </a:fld>
             <a:endParaRPr lang="en-US"/>
           </a:p>
@@ -814,7 +814,7 @@
     </p:spTree>
     <p:extLst>
       <p:ext uri="{BB962C8B-B14F-4D97-AF65-F5344CB8AC3E}">
-        <p14:creationId xmlns:p14="http://schemas.microsoft.com/office/powerpoint/2010/main" val="313662833"/>
+        <p14:creationId xmlns:p14="http://schemas.microsoft.com/office/powerpoint/2010/main" val="3207004064"/>
       </p:ext>
     </p:extLst>
   </p:cSld>
@@ -853,15 +853,15 @@
         </p:nvSpPr>
         <p:spPr>
           <a:xfrm>
-            <a:off x="467916" y="2414216"/>
-            <a:ext cx="5915025" cy="4028170"/>
+            <a:off x="623888" y="3039537"/>
+            <a:ext cx="7886700" cy="5071532"/>
           </a:xfrm>
         </p:spPr>
         <p:txBody>
           <a:bodyPr anchor="b"/>
           <a:lstStyle>
             <a:lvl1pPr>
-              <a:defRPr sz="4500"/>
+              <a:defRPr sz="6000"/>
             </a:lvl1pPr>
           </a:lstStyle>
           <a:p>
@@ -885,8 +885,8 @@
         </p:nvSpPr>
         <p:spPr>
           <a:xfrm>
-            <a:off x="467916" y="6480494"/>
-            <a:ext cx="5915025" cy="2118320"/>
+            <a:off x="623888" y="8159048"/>
+            <a:ext cx="7886700" cy="2666999"/>
           </a:xfrm>
         </p:spPr>
         <p:txBody>
@@ -894,15 +894,15 @@
           <a:lstStyle>
             <a:lvl1pPr marL="0" indent="0">
               <a:buNone/>
-              <a:defRPr sz="1800">
+              <a:defRPr sz="2400">
                 <a:solidFill>
                   <a:schemeClr val="tx1"/>
                 </a:solidFill>
               </a:defRPr>
             </a:lvl1pPr>
-            <a:lvl2pPr marL="342900" indent="0">
-              <a:buNone/>
-              <a:defRPr sz="1500">
+            <a:lvl2pPr marL="457200" indent="0">
+              <a:buNone/>
+              <a:defRPr sz="2000">
                 <a:solidFill>
                   <a:schemeClr val="tx1">
                     <a:tint val="75000"/>
@@ -910,9 +910,9 @@
                 </a:solidFill>
               </a:defRPr>
             </a:lvl2pPr>
-            <a:lvl3pPr marL="685800" indent="0">
-              <a:buNone/>
-              <a:defRPr sz="1350">
+            <a:lvl3pPr marL="914400" indent="0">
+              <a:buNone/>
+              <a:defRPr sz="1800">
                 <a:solidFill>
                   <a:schemeClr val="tx1">
                     <a:tint val="75000"/>
@@ -920,9 +920,9 @@
                 </a:solidFill>
               </a:defRPr>
             </a:lvl3pPr>
-            <a:lvl4pPr marL="1028700" indent="0">
-              <a:buNone/>
-              <a:defRPr sz="1200">
+            <a:lvl4pPr marL="1371600" indent="0">
+              <a:buNone/>
+              <a:defRPr sz="1600">
                 <a:solidFill>
                   <a:schemeClr val="tx1">
                     <a:tint val="75000"/>
@@ -930,9 +930,9 @@
                 </a:solidFill>
               </a:defRPr>
             </a:lvl4pPr>
-            <a:lvl5pPr marL="1371600" indent="0">
-              <a:buNone/>
-              <a:defRPr sz="1200">
+            <a:lvl5pPr marL="1828800" indent="0">
+              <a:buNone/>
+              <a:defRPr sz="1600">
                 <a:solidFill>
                   <a:schemeClr val="tx1">
                     <a:tint val="75000"/>
@@ -940,9 +940,9 @@
                 </a:solidFill>
               </a:defRPr>
             </a:lvl5pPr>
-            <a:lvl6pPr marL="1714500" indent="0">
-              <a:buNone/>
-              <a:defRPr sz="1200">
+            <a:lvl6pPr marL="2286000" indent="0">
+              <a:buNone/>
+              <a:defRPr sz="1600">
                 <a:solidFill>
                   <a:schemeClr val="tx1">
                     <a:tint val="75000"/>
@@ -950,9 +950,9 @@
                 </a:solidFill>
               </a:defRPr>
             </a:lvl6pPr>
-            <a:lvl7pPr marL="2057400" indent="0">
-              <a:buNone/>
-              <a:defRPr sz="1200">
+            <a:lvl7pPr marL="2743200" indent="0">
+              <a:buNone/>
+              <a:defRPr sz="1600">
                 <a:solidFill>
                   <a:schemeClr val="tx1">
                     <a:tint val="75000"/>
@@ -960,9 +960,9 @@
                 </a:solidFill>
               </a:defRPr>
             </a:lvl7pPr>
-            <a:lvl8pPr marL="2400300" indent="0">
-              <a:buNone/>
-              <a:defRPr sz="1200">
+            <a:lvl8pPr marL="3200400" indent="0">
+              <a:buNone/>
+              <a:defRPr sz="1600">
                 <a:solidFill>
                   <a:schemeClr val="tx1">
                     <a:tint val="75000"/>
@@ -970,9 +970,9 @@
                 </a:solidFill>
               </a:defRPr>
             </a:lvl8pPr>
-            <a:lvl9pPr marL="2743200" indent="0">
-              <a:buNone/>
-              <a:defRPr sz="1200">
+            <a:lvl9pPr marL="3657600" indent="0">
+              <a:buNone/>
+              <a:defRPr sz="1600">
                 <a:solidFill>
                   <a:schemeClr val="tx1">
                     <a:tint val="75000"/>
@@ -985,7 +985,7 @@
             <a:pPr lvl="0"/>
             <a:r>
               <a:rPr lang="en-US"/>
-              <a:t>Edit Master text styles</a:t>
+              <a:t>Click to edit Master text styles</a:t>
             </a:r>
           </a:p>
         </p:txBody>
@@ -1007,7 +1007,7 @@
           <a:p>
             <a:fld id="{75631D6F-10A1-474F-A874-C81F1BE1340A}" type="datetimeFigureOut">
               <a:rPr lang="en-US" smtClean="0"/>
-              <a:t>3/24/23</a:t>
+              <a:t>7/18/24</a:t>
             </a:fld>
             <a:endParaRPr lang="en-US"/>
           </a:p>
@@ -1058,7 +1058,7 @@
     </p:spTree>
     <p:extLst>
       <p:ext uri="{BB962C8B-B14F-4D97-AF65-F5344CB8AC3E}">
-        <p14:creationId xmlns:p14="http://schemas.microsoft.com/office/powerpoint/2010/main" val="712968006"/>
+        <p14:creationId xmlns:p14="http://schemas.microsoft.com/office/powerpoint/2010/main" val="2496793499"/>
       </p:ext>
     </p:extLst>
   </p:cSld>
@@ -1120,8 +1120,8 @@
         </p:nvSpPr>
         <p:spPr>
           <a:xfrm>
-            <a:off x="471488" y="2577850"/>
-            <a:ext cx="2914650" cy="6144250"/>
+            <a:off x="628650" y="3245556"/>
+            <a:ext cx="3886200" cy="7735712"/>
           </a:xfrm>
         </p:spPr>
         <p:txBody>
@@ -1131,7 +1131,7 @@
             <a:pPr lvl="0"/>
             <a:r>
               <a:rPr lang="en-US"/>
-              <a:t>Edit Master text styles</a:t>
+              <a:t>Click to edit Master text styles</a:t>
             </a:r>
           </a:p>
           <a:p>
@@ -1177,8 +1177,8 @@
         </p:nvSpPr>
         <p:spPr>
           <a:xfrm>
-            <a:off x="3471863" y="2577850"/>
-            <a:ext cx="2914650" cy="6144250"/>
+            <a:off x="4629150" y="3245556"/>
+            <a:ext cx="3886200" cy="7735712"/>
           </a:xfrm>
         </p:spPr>
         <p:txBody>
@@ -1188,7 +1188,7 @@
             <a:pPr lvl="0"/>
             <a:r>
               <a:rPr lang="en-US"/>
-              <a:t>Edit Master text styles</a:t>
+              <a:t>Click to edit Master text styles</a:t>
             </a:r>
           </a:p>
           <a:p>
@@ -1239,7 +1239,7 @@
           <a:p>
             <a:fld id="{75631D6F-10A1-474F-A874-C81F1BE1340A}" type="datetimeFigureOut">
               <a:rPr lang="en-US" smtClean="0"/>
-              <a:t>3/24/23</a:t>
+              <a:t>7/18/24</a:t>
             </a:fld>
             <a:endParaRPr lang="en-US"/>
           </a:p>
@@ -1290,7 +1290,7 @@
     </p:spTree>
     <p:extLst>
       <p:ext uri="{BB962C8B-B14F-4D97-AF65-F5344CB8AC3E}">
-        <p14:creationId xmlns:p14="http://schemas.microsoft.com/office/powerpoint/2010/main" val="6290520"/>
+        <p14:creationId xmlns:p14="http://schemas.microsoft.com/office/powerpoint/2010/main" val="3538220673"/>
       </p:ext>
     </p:extLst>
   </p:cSld>
@@ -1329,8 +1329,8 @@
         </p:nvSpPr>
         <p:spPr>
           <a:xfrm>
-            <a:off x="472381" y="515572"/>
-            <a:ext cx="5915025" cy="1871744"/>
+            <a:off x="629841" y="649114"/>
+            <a:ext cx="7886700" cy="2356556"/>
           </a:xfrm>
         </p:spPr>
         <p:txBody>
@@ -1357,8 +1357,8 @@
         </p:nvSpPr>
         <p:spPr>
           <a:xfrm>
-            <a:off x="472381" y="2373865"/>
-            <a:ext cx="2901255" cy="1163394"/>
+            <a:off x="629842" y="2988734"/>
+            <a:ext cx="3868340" cy="1464732"/>
           </a:xfrm>
         </p:spPr>
         <p:txBody>
@@ -1366,46 +1366,46 @@
           <a:lstStyle>
             <a:lvl1pPr marL="0" indent="0">
               <a:buNone/>
+              <a:defRPr sz="2400" b="1"/>
+            </a:lvl1pPr>
+            <a:lvl2pPr marL="457200" indent="0">
+              <a:buNone/>
+              <a:defRPr sz="2000" b="1"/>
+            </a:lvl2pPr>
+            <a:lvl3pPr marL="914400" indent="0">
+              <a:buNone/>
               <a:defRPr sz="1800" b="1"/>
-            </a:lvl1pPr>
-            <a:lvl2pPr marL="342900" indent="0">
-              <a:buNone/>
-              <a:defRPr sz="1500" b="1"/>
-            </a:lvl2pPr>
-            <a:lvl3pPr marL="685800" indent="0">
-              <a:buNone/>
-              <a:defRPr sz="1350" b="1"/>
             </a:lvl3pPr>
-            <a:lvl4pPr marL="1028700" indent="0">
-              <a:buNone/>
-              <a:defRPr sz="1200" b="1"/>
+            <a:lvl4pPr marL="1371600" indent="0">
+              <a:buNone/>
+              <a:defRPr sz="1600" b="1"/>
             </a:lvl4pPr>
-            <a:lvl5pPr marL="1371600" indent="0">
-              <a:buNone/>
-              <a:defRPr sz="1200" b="1"/>
+            <a:lvl5pPr marL="1828800" indent="0">
+              <a:buNone/>
+              <a:defRPr sz="1600" b="1"/>
             </a:lvl5pPr>
-            <a:lvl6pPr marL="1714500" indent="0">
-              <a:buNone/>
-              <a:defRPr sz="1200" b="1"/>
+            <a:lvl6pPr marL="2286000" indent="0">
+              <a:buNone/>
+              <a:defRPr sz="1600" b="1"/>
             </a:lvl6pPr>
-            <a:lvl7pPr marL="2057400" indent="0">
-              <a:buNone/>
-              <a:defRPr sz="1200" b="1"/>
+            <a:lvl7pPr marL="2743200" indent="0">
+              <a:buNone/>
+              <a:defRPr sz="1600" b="1"/>
             </a:lvl7pPr>
-            <a:lvl8pPr marL="2400300" indent="0">
-              <a:buNone/>
-              <a:defRPr sz="1200" b="1"/>
+            <a:lvl8pPr marL="3200400" indent="0">
+              <a:buNone/>
+              <a:defRPr sz="1600" b="1"/>
             </a:lvl8pPr>
-            <a:lvl9pPr marL="2743200" indent="0">
-              <a:buNone/>
-              <a:defRPr sz="1200" b="1"/>
+            <a:lvl9pPr marL="3657600" indent="0">
+              <a:buNone/>
+              <a:defRPr sz="1600" b="1"/>
             </a:lvl9pPr>
           </a:lstStyle>
           <a:p>
             <a:pPr lvl="0"/>
             <a:r>
               <a:rPr lang="en-US"/>
-              <a:t>Edit Master text styles</a:t>
+              <a:t>Click to edit Master text styles</a:t>
             </a:r>
           </a:p>
         </p:txBody>
@@ -1422,8 +1422,8 @@
         </p:nvSpPr>
         <p:spPr>
           <a:xfrm>
-            <a:off x="472381" y="3537259"/>
-            <a:ext cx="2901255" cy="5202775"/>
+            <a:off x="629842" y="4453467"/>
+            <a:ext cx="3868340" cy="6550379"/>
           </a:xfrm>
         </p:spPr>
         <p:txBody>
@@ -1433,7 +1433,7 @@
             <a:pPr lvl="0"/>
             <a:r>
               <a:rPr lang="en-US"/>
-              <a:t>Edit Master text styles</a:t>
+              <a:t>Click to edit Master text styles</a:t>
             </a:r>
           </a:p>
           <a:p>
@@ -1479,8 +1479,8 @@
         </p:nvSpPr>
         <p:spPr>
           <a:xfrm>
-            <a:off x="3471863" y="2373865"/>
-            <a:ext cx="2915543" cy="1163394"/>
+            <a:off x="4629151" y="2988734"/>
+            <a:ext cx="3887391" cy="1464732"/>
           </a:xfrm>
         </p:spPr>
         <p:txBody>
@@ -1488,46 +1488,46 @@
           <a:lstStyle>
             <a:lvl1pPr marL="0" indent="0">
               <a:buNone/>
+              <a:defRPr sz="2400" b="1"/>
+            </a:lvl1pPr>
+            <a:lvl2pPr marL="457200" indent="0">
+              <a:buNone/>
+              <a:defRPr sz="2000" b="1"/>
+            </a:lvl2pPr>
+            <a:lvl3pPr marL="914400" indent="0">
+              <a:buNone/>
               <a:defRPr sz="1800" b="1"/>
-            </a:lvl1pPr>
-            <a:lvl2pPr marL="342900" indent="0">
-              <a:buNone/>
-              <a:defRPr sz="1500" b="1"/>
-            </a:lvl2pPr>
-            <a:lvl3pPr marL="685800" indent="0">
-              <a:buNone/>
-              <a:defRPr sz="1350" b="1"/>
             </a:lvl3pPr>
-            <a:lvl4pPr marL="1028700" indent="0">
-              <a:buNone/>
-              <a:defRPr sz="1200" b="1"/>
+            <a:lvl4pPr marL="1371600" indent="0">
+              <a:buNone/>
+              <a:defRPr sz="1600" b="1"/>
             </a:lvl4pPr>
-            <a:lvl5pPr marL="1371600" indent="0">
-              <a:buNone/>
-              <a:defRPr sz="1200" b="1"/>
+            <a:lvl5pPr marL="1828800" indent="0">
+              <a:buNone/>
+              <a:defRPr sz="1600" b="1"/>
             </a:lvl5pPr>
-            <a:lvl6pPr marL="1714500" indent="0">
-              <a:buNone/>
-              <a:defRPr sz="1200" b="1"/>
+            <a:lvl6pPr marL="2286000" indent="0">
+              <a:buNone/>
+              <a:defRPr sz="1600" b="1"/>
             </a:lvl6pPr>
-            <a:lvl7pPr marL="2057400" indent="0">
-              <a:buNone/>
-              <a:defRPr sz="1200" b="1"/>
+            <a:lvl7pPr marL="2743200" indent="0">
+              <a:buNone/>
+              <a:defRPr sz="1600" b="1"/>
             </a:lvl7pPr>
-            <a:lvl8pPr marL="2400300" indent="0">
-              <a:buNone/>
-              <a:defRPr sz="1200" b="1"/>
+            <a:lvl8pPr marL="3200400" indent="0">
+              <a:buNone/>
+              <a:defRPr sz="1600" b="1"/>
             </a:lvl8pPr>
-            <a:lvl9pPr marL="2743200" indent="0">
-              <a:buNone/>
-              <a:defRPr sz="1200" b="1"/>
+            <a:lvl9pPr marL="3657600" indent="0">
+              <a:buNone/>
+              <a:defRPr sz="1600" b="1"/>
             </a:lvl9pPr>
           </a:lstStyle>
           <a:p>
             <a:pPr lvl="0"/>
             <a:r>
               <a:rPr lang="en-US"/>
-              <a:t>Edit Master text styles</a:t>
+              <a:t>Click to edit Master text styles</a:t>
             </a:r>
           </a:p>
         </p:txBody>
@@ -1544,8 +1544,8 @@
         </p:nvSpPr>
         <p:spPr>
           <a:xfrm>
-            <a:off x="3471863" y="3537259"/>
-            <a:ext cx="2915543" cy="5202775"/>
+            <a:off x="4629151" y="4453467"/>
+            <a:ext cx="3887391" cy="6550379"/>
           </a:xfrm>
         </p:spPr>
         <p:txBody>
@@ -1555,7 +1555,7 @@
             <a:pPr lvl="0"/>
             <a:r>
               <a:rPr lang="en-US"/>
-              <a:t>Edit Master text styles</a:t>
+              <a:t>Click to edit Master text styles</a:t>
             </a:r>
           </a:p>
           <a:p>
@@ -1606,7 +1606,7 @@
           <a:p>
             <a:fld id="{75631D6F-10A1-474F-A874-C81F1BE1340A}" type="datetimeFigureOut">
               <a:rPr lang="en-US" smtClean="0"/>
-              <a:t>3/24/23</a:t>
+              <a:t>7/18/24</a:t>
             </a:fld>
             <a:endParaRPr lang="en-US"/>
           </a:p>
@@ -1657,7 +1657,7 @@
     </p:spTree>
     <p:extLst>
       <p:ext uri="{BB962C8B-B14F-4D97-AF65-F5344CB8AC3E}">
-        <p14:creationId xmlns:p14="http://schemas.microsoft.com/office/powerpoint/2010/main" val="2307317157"/>
+        <p14:creationId xmlns:p14="http://schemas.microsoft.com/office/powerpoint/2010/main" val="2709531054"/>
       </p:ext>
     </p:extLst>
   </p:cSld>
@@ -1724,7 +1724,7 @@
           <a:p>
             <a:fld id="{75631D6F-10A1-474F-A874-C81F1BE1340A}" type="datetimeFigureOut">
               <a:rPr lang="en-US" smtClean="0"/>
-              <a:t>3/24/23</a:t>
+              <a:t>7/18/24</a:t>
             </a:fld>
             <a:endParaRPr lang="en-US"/>
           </a:p>
@@ -1775,7 +1775,7 @@
     </p:spTree>
     <p:extLst>
       <p:ext uri="{BB962C8B-B14F-4D97-AF65-F5344CB8AC3E}">
-        <p14:creationId xmlns:p14="http://schemas.microsoft.com/office/powerpoint/2010/main" val="2878596555"/>
+        <p14:creationId xmlns:p14="http://schemas.microsoft.com/office/powerpoint/2010/main" val="825733662"/>
       </p:ext>
     </p:extLst>
   </p:cSld>
@@ -1819,7 +1819,7 @@
           <a:p>
             <a:fld id="{75631D6F-10A1-474F-A874-C81F1BE1340A}" type="datetimeFigureOut">
               <a:rPr lang="en-US" smtClean="0"/>
-              <a:t>3/24/23</a:t>
+              <a:t>7/18/24</a:t>
             </a:fld>
             <a:endParaRPr lang="en-US"/>
           </a:p>
@@ -1870,7 +1870,7 @@
     </p:spTree>
     <p:extLst>
       <p:ext uri="{BB962C8B-B14F-4D97-AF65-F5344CB8AC3E}">
-        <p14:creationId xmlns:p14="http://schemas.microsoft.com/office/powerpoint/2010/main" val="2454377656"/>
+        <p14:creationId xmlns:p14="http://schemas.microsoft.com/office/powerpoint/2010/main" val="3420856930"/>
       </p:ext>
     </p:extLst>
   </p:cSld>
@@ -1909,15 +1909,15 @@
         </p:nvSpPr>
         <p:spPr>
           <a:xfrm>
-            <a:off x="472381" y="645583"/>
-            <a:ext cx="2211884" cy="2259542"/>
+            <a:off x="629841" y="812800"/>
+            <a:ext cx="2949178" cy="2844800"/>
           </a:xfrm>
         </p:spPr>
         <p:txBody>
           <a:bodyPr anchor="b"/>
           <a:lstStyle>
             <a:lvl1pPr>
-              <a:defRPr sz="2400"/>
+              <a:defRPr sz="3200"/>
             </a:lvl1pPr>
           </a:lstStyle>
           <a:p>
@@ -1941,46 +1941,46 @@
         </p:nvSpPr>
         <p:spPr>
           <a:xfrm>
-            <a:off x="2915543" y="1394283"/>
-            <a:ext cx="3471863" cy="6881739"/>
+            <a:off x="3887391" y="1755425"/>
+            <a:ext cx="4629150" cy="8664222"/>
           </a:xfrm>
         </p:spPr>
         <p:txBody>
           <a:bodyPr/>
           <a:lstStyle>
             <a:lvl1pPr>
-              <a:defRPr sz="2400"/>
+              <a:defRPr sz="3200"/>
             </a:lvl1pPr>
             <a:lvl2pPr>
-              <a:defRPr sz="2100"/>
+              <a:defRPr sz="2800"/>
             </a:lvl2pPr>
             <a:lvl3pPr>
-              <a:defRPr sz="1800"/>
+              <a:defRPr sz="2400"/>
             </a:lvl3pPr>
             <a:lvl4pPr>
-              <a:defRPr sz="1500"/>
+              <a:defRPr sz="2000"/>
             </a:lvl4pPr>
             <a:lvl5pPr>
-              <a:defRPr sz="1500"/>
+              <a:defRPr sz="2000"/>
             </a:lvl5pPr>
             <a:lvl6pPr>
-              <a:defRPr sz="1500"/>
+              <a:defRPr sz="2000"/>
             </a:lvl6pPr>
             <a:lvl7pPr>
-              <a:defRPr sz="1500"/>
+              <a:defRPr sz="2000"/>
             </a:lvl7pPr>
             <a:lvl8pPr>
-              <a:defRPr sz="1500"/>
+              <a:defRPr sz="2000"/>
             </a:lvl8pPr>
             <a:lvl9pPr>
-              <a:defRPr sz="1500"/>
+              <a:defRPr sz="2000"/>
             </a:lvl9pPr>
           </a:lstStyle>
           <a:p>
             <a:pPr lvl="0"/>
             <a:r>
               <a:rPr lang="en-US"/>
-              <a:t>Edit Master text styles</a:t>
+              <a:t>Click to edit Master text styles</a:t>
             </a:r>
           </a:p>
           <a:p>
@@ -2026,8 +2026,8 @@
         </p:nvSpPr>
         <p:spPr>
           <a:xfrm>
-            <a:off x="472381" y="2905125"/>
-            <a:ext cx="2211884" cy="5382103"/>
+            <a:off x="629841" y="3657600"/>
+            <a:ext cx="2949178" cy="6776156"/>
           </a:xfrm>
         </p:spPr>
         <p:txBody>
@@ -2035,46 +2035,46 @@
           <a:lstStyle>
             <a:lvl1pPr marL="0" indent="0">
               <a:buNone/>
+              <a:defRPr sz="1600"/>
+            </a:lvl1pPr>
+            <a:lvl2pPr marL="457200" indent="0">
+              <a:buNone/>
+              <a:defRPr sz="1400"/>
+            </a:lvl2pPr>
+            <a:lvl3pPr marL="914400" indent="0">
+              <a:buNone/>
               <a:defRPr sz="1200"/>
-            </a:lvl1pPr>
-            <a:lvl2pPr marL="342900" indent="0">
-              <a:buNone/>
-              <a:defRPr sz="1050"/>
-            </a:lvl2pPr>
-            <a:lvl3pPr marL="685800" indent="0">
-              <a:buNone/>
-              <a:defRPr sz="900"/>
             </a:lvl3pPr>
-            <a:lvl4pPr marL="1028700" indent="0">
-              <a:buNone/>
-              <a:defRPr sz="750"/>
+            <a:lvl4pPr marL="1371600" indent="0">
+              <a:buNone/>
+              <a:defRPr sz="1000"/>
             </a:lvl4pPr>
-            <a:lvl5pPr marL="1371600" indent="0">
-              <a:buNone/>
-              <a:defRPr sz="750"/>
+            <a:lvl5pPr marL="1828800" indent="0">
+              <a:buNone/>
+              <a:defRPr sz="1000"/>
             </a:lvl5pPr>
-            <a:lvl6pPr marL="1714500" indent="0">
-              <a:buNone/>
-              <a:defRPr sz="750"/>
+            <a:lvl6pPr marL="2286000" indent="0">
+              <a:buNone/>
+              <a:defRPr sz="1000"/>
             </a:lvl6pPr>
-            <a:lvl7pPr marL="2057400" indent="0">
-              <a:buNone/>
-              <a:defRPr sz="750"/>
+            <a:lvl7pPr marL="2743200" indent="0">
+              <a:buNone/>
+              <a:defRPr sz="1000"/>
             </a:lvl7pPr>
-            <a:lvl8pPr marL="2400300" indent="0">
-              <a:buNone/>
-              <a:defRPr sz="750"/>
+            <a:lvl8pPr marL="3200400" indent="0">
+              <a:buNone/>
+              <a:defRPr sz="1000"/>
             </a:lvl8pPr>
-            <a:lvl9pPr marL="2743200" indent="0">
-              <a:buNone/>
-              <a:defRPr sz="750"/>
+            <a:lvl9pPr marL="3657600" indent="0">
+              <a:buNone/>
+              <a:defRPr sz="1000"/>
             </a:lvl9pPr>
           </a:lstStyle>
           <a:p>
             <a:pPr lvl="0"/>
             <a:r>
               <a:rPr lang="en-US"/>
-              <a:t>Edit Master text styles</a:t>
+              <a:t>Click to edit Master text styles</a:t>
             </a:r>
           </a:p>
         </p:txBody>
@@ -2096,7 +2096,7 @@
           <a:p>
             <a:fld id="{75631D6F-10A1-474F-A874-C81F1BE1340A}" type="datetimeFigureOut">
               <a:rPr lang="en-US" smtClean="0"/>
-              <a:t>3/24/23</a:t>
+              <a:t>7/18/24</a:t>
             </a:fld>
             <a:endParaRPr lang="en-US"/>
           </a:p>
@@ -2147,7 +2147,7 @@
     </p:spTree>
     <p:extLst>
       <p:ext uri="{BB962C8B-B14F-4D97-AF65-F5344CB8AC3E}">
-        <p14:creationId xmlns:p14="http://schemas.microsoft.com/office/powerpoint/2010/main" val="1543094656"/>
+        <p14:creationId xmlns:p14="http://schemas.microsoft.com/office/powerpoint/2010/main" val="2554372520"/>
       </p:ext>
     </p:extLst>
   </p:cSld>
@@ -2186,15 +2186,15 @@
         </p:nvSpPr>
         <p:spPr>
           <a:xfrm>
-            <a:off x="472381" y="645583"/>
-            <a:ext cx="2211884" cy="2259542"/>
+            <a:off x="629841" y="812800"/>
+            <a:ext cx="2949178" cy="2844800"/>
           </a:xfrm>
         </p:spPr>
         <p:txBody>
           <a:bodyPr anchor="b"/>
           <a:lstStyle>
             <a:lvl1pPr>
-              <a:defRPr sz="2400"/>
+              <a:defRPr sz="3200"/>
             </a:lvl1pPr>
           </a:lstStyle>
           <a:p>
@@ -2218,8 +2218,8 @@
         </p:nvSpPr>
         <p:spPr>
           <a:xfrm>
-            <a:off x="2915543" y="1394283"/>
-            <a:ext cx="3471863" cy="6881739"/>
+            <a:off x="3887391" y="1755425"/>
+            <a:ext cx="4629150" cy="8664222"/>
           </a:xfrm>
         </p:spPr>
         <p:txBody>
@@ -2227,39 +2227,39 @@
           <a:lstStyle>
             <a:lvl1pPr marL="0" indent="0">
               <a:buNone/>
+              <a:defRPr sz="3200"/>
+            </a:lvl1pPr>
+            <a:lvl2pPr marL="457200" indent="0">
+              <a:buNone/>
+              <a:defRPr sz="2800"/>
+            </a:lvl2pPr>
+            <a:lvl3pPr marL="914400" indent="0">
+              <a:buNone/>
               <a:defRPr sz="2400"/>
-            </a:lvl1pPr>
-            <a:lvl2pPr marL="342900" indent="0">
-              <a:buNone/>
-              <a:defRPr sz="2100"/>
-            </a:lvl2pPr>
-            <a:lvl3pPr marL="685800" indent="0">
-              <a:buNone/>
-              <a:defRPr sz="1800"/>
             </a:lvl3pPr>
-            <a:lvl4pPr marL="1028700" indent="0">
-              <a:buNone/>
-              <a:defRPr sz="1500"/>
+            <a:lvl4pPr marL="1371600" indent="0">
+              <a:buNone/>
+              <a:defRPr sz="2000"/>
             </a:lvl4pPr>
-            <a:lvl5pPr marL="1371600" indent="0">
-              <a:buNone/>
-              <a:defRPr sz="1500"/>
+            <a:lvl5pPr marL="1828800" indent="0">
+              <a:buNone/>
+              <a:defRPr sz="2000"/>
             </a:lvl5pPr>
-            <a:lvl6pPr marL="1714500" indent="0">
-              <a:buNone/>
-              <a:defRPr sz="1500"/>
+            <a:lvl6pPr marL="2286000" indent="0">
+              <a:buNone/>
+              <a:defRPr sz="2000"/>
             </a:lvl6pPr>
-            <a:lvl7pPr marL="2057400" indent="0">
-              <a:buNone/>
-              <a:defRPr sz="1500"/>
+            <a:lvl7pPr marL="2743200" indent="0">
+              <a:buNone/>
+              <a:defRPr sz="2000"/>
             </a:lvl7pPr>
-            <a:lvl8pPr marL="2400300" indent="0">
-              <a:buNone/>
-              <a:defRPr sz="1500"/>
+            <a:lvl8pPr marL="3200400" indent="0">
+              <a:buNone/>
+              <a:defRPr sz="2000"/>
             </a:lvl8pPr>
-            <a:lvl9pPr marL="2743200" indent="0">
-              <a:buNone/>
-              <a:defRPr sz="1500"/>
+            <a:lvl9pPr marL="3657600" indent="0">
+              <a:buNone/>
+              <a:defRPr sz="2000"/>
             </a:lvl9pPr>
           </a:lstStyle>
           <a:p>
@@ -2283,8 +2283,8 @@
         </p:nvSpPr>
         <p:spPr>
           <a:xfrm>
-            <a:off x="472381" y="2905125"/>
-            <a:ext cx="2211884" cy="5382103"/>
+            <a:off x="629841" y="3657600"/>
+            <a:ext cx="2949178" cy="6776156"/>
           </a:xfrm>
         </p:spPr>
         <p:txBody>
@@ -2292,46 +2292,46 @@
           <a:lstStyle>
             <a:lvl1pPr marL="0" indent="0">
               <a:buNone/>
+              <a:defRPr sz="1600"/>
+            </a:lvl1pPr>
+            <a:lvl2pPr marL="457200" indent="0">
+              <a:buNone/>
+              <a:defRPr sz="1400"/>
+            </a:lvl2pPr>
+            <a:lvl3pPr marL="914400" indent="0">
+              <a:buNone/>
               <a:defRPr sz="1200"/>
-            </a:lvl1pPr>
-            <a:lvl2pPr marL="342900" indent="0">
-              <a:buNone/>
-              <a:defRPr sz="1050"/>
-            </a:lvl2pPr>
-            <a:lvl3pPr marL="685800" indent="0">
-              <a:buNone/>
-              <a:defRPr sz="900"/>
             </a:lvl3pPr>
-            <a:lvl4pPr marL="1028700" indent="0">
-              <a:buNone/>
-              <a:defRPr sz="750"/>
+            <a:lvl4pPr marL="1371600" indent="0">
+              <a:buNone/>
+              <a:defRPr sz="1000"/>
             </a:lvl4pPr>
-            <a:lvl5pPr marL="1371600" indent="0">
-              <a:buNone/>
-              <a:defRPr sz="750"/>
+            <a:lvl5pPr marL="1828800" indent="0">
+              <a:buNone/>
+              <a:defRPr sz="1000"/>
             </a:lvl5pPr>
-            <a:lvl6pPr marL="1714500" indent="0">
-              <a:buNone/>
-              <a:defRPr sz="750"/>
+            <a:lvl6pPr marL="2286000" indent="0">
+              <a:buNone/>
+              <a:defRPr sz="1000"/>
             </a:lvl6pPr>
-            <a:lvl7pPr marL="2057400" indent="0">
-              <a:buNone/>
-              <a:defRPr sz="750"/>
+            <a:lvl7pPr marL="2743200" indent="0">
+              <a:buNone/>
+              <a:defRPr sz="1000"/>
             </a:lvl7pPr>
-            <a:lvl8pPr marL="2400300" indent="0">
-              <a:buNone/>
-              <a:defRPr sz="750"/>
+            <a:lvl8pPr marL="3200400" indent="0">
+              <a:buNone/>
+              <a:defRPr sz="1000"/>
             </a:lvl8pPr>
-            <a:lvl9pPr marL="2743200" indent="0">
-              <a:buNone/>
-              <a:defRPr sz="750"/>
+            <a:lvl9pPr marL="3657600" indent="0">
+              <a:buNone/>
+              <a:defRPr sz="1000"/>
             </a:lvl9pPr>
           </a:lstStyle>
           <a:p>
             <a:pPr lvl="0"/>
             <a:r>
               <a:rPr lang="en-US"/>
-              <a:t>Edit Master text styles</a:t>
+              <a:t>Click to edit Master text styles</a:t>
             </a:r>
           </a:p>
         </p:txBody>
@@ -2353,7 +2353,7 @@
           <a:p>
             <a:fld id="{75631D6F-10A1-474F-A874-C81F1BE1340A}" type="datetimeFigureOut">
               <a:rPr lang="en-US" smtClean="0"/>
-              <a:t>3/24/23</a:t>
+              <a:t>7/18/24</a:t>
             </a:fld>
             <a:endParaRPr lang="en-US"/>
           </a:p>
@@ -2404,7 +2404,7 @@
     </p:spTree>
     <p:extLst>
       <p:ext uri="{BB962C8B-B14F-4D97-AF65-F5344CB8AC3E}">
-        <p14:creationId xmlns:p14="http://schemas.microsoft.com/office/powerpoint/2010/main" val="618530621"/>
+        <p14:creationId xmlns:p14="http://schemas.microsoft.com/office/powerpoint/2010/main" val="1486768968"/>
       </p:ext>
     </p:extLst>
   </p:cSld>
@@ -2448,8 +2448,8 @@
         </p:nvSpPr>
         <p:spPr>
           <a:xfrm>
-            <a:off x="471488" y="515572"/>
-            <a:ext cx="5915025" cy="1871744"/>
+            <a:off x="628650" y="649114"/>
+            <a:ext cx="7886700" cy="2356556"/>
           </a:xfrm>
           <a:prstGeom prst="rect">
             <a:avLst/>
@@ -2481,8 +2481,8 @@
         </p:nvSpPr>
         <p:spPr>
           <a:xfrm>
-            <a:off x="471488" y="2577850"/>
-            <a:ext cx="5915025" cy="6144250"/>
+            <a:off x="628650" y="3245556"/>
+            <a:ext cx="7886700" cy="7735712"/>
           </a:xfrm>
           <a:prstGeom prst="rect">
             <a:avLst/>
@@ -2497,7 +2497,7 @@
             <a:pPr lvl="0"/>
             <a:r>
               <a:rPr lang="en-US"/>
-              <a:t>Edit Master text styles</a:t>
+              <a:t>Click to edit Master text styles</a:t>
             </a:r>
           </a:p>
           <a:p>
@@ -2543,8 +2543,8 @@
         </p:nvSpPr>
         <p:spPr>
           <a:xfrm>
-            <a:off x="471488" y="8975404"/>
-            <a:ext cx="1543050" cy="515570"/>
+            <a:off x="628650" y="11300181"/>
+            <a:ext cx="2057400" cy="649111"/>
           </a:xfrm>
           <a:prstGeom prst="rect">
             <a:avLst/>
@@ -2554,7 +2554,7 @@
           <a:bodyPr vert="horz" lIns="91440" tIns="45720" rIns="91440" bIns="45720" rtlCol="0" anchor="ctr"/>
           <a:lstStyle>
             <a:lvl1pPr algn="l">
-              <a:defRPr sz="900">
+              <a:defRPr sz="1200">
                 <a:solidFill>
                   <a:schemeClr val="tx1">
                     <a:tint val="75000"/>
@@ -2566,7 +2566,7 @@
           <a:p>
             <a:fld id="{75631D6F-10A1-474F-A874-C81F1BE1340A}" type="datetimeFigureOut">
               <a:rPr lang="en-US" smtClean="0"/>
-              <a:t>3/24/23</a:t>
+              <a:t>7/18/24</a:t>
             </a:fld>
             <a:endParaRPr lang="en-US"/>
           </a:p>
@@ -2584,8 +2584,8 @@
         </p:nvSpPr>
         <p:spPr>
           <a:xfrm>
-            <a:off x="2271713" y="8975404"/>
-            <a:ext cx="2314575" cy="515570"/>
+            <a:off x="3028950" y="11300181"/>
+            <a:ext cx="3086100" cy="649111"/>
           </a:xfrm>
           <a:prstGeom prst="rect">
             <a:avLst/>
@@ -2595,7 +2595,7 @@
           <a:bodyPr vert="horz" lIns="91440" tIns="45720" rIns="91440" bIns="45720" rtlCol="0" anchor="ctr"/>
           <a:lstStyle>
             <a:lvl1pPr algn="ctr">
-              <a:defRPr sz="900">
+              <a:defRPr sz="1200">
                 <a:solidFill>
                   <a:schemeClr val="tx1">
                     <a:tint val="75000"/>
@@ -2621,8 +2621,8 @@
         </p:nvSpPr>
         <p:spPr>
           <a:xfrm>
-            <a:off x="4843463" y="8975404"/>
-            <a:ext cx="1543050" cy="515570"/>
+            <a:off x="6457950" y="11300181"/>
+            <a:ext cx="2057400" cy="649111"/>
           </a:xfrm>
           <a:prstGeom prst="rect">
             <a:avLst/>
@@ -2632,7 +2632,7 @@
           <a:bodyPr vert="horz" lIns="91440" tIns="45720" rIns="91440" bIns="45720" rtlCol="0" anchor="ctr"/>
           <a:lstStyle>
             <a:lvl1pPr algn="r">
-              <a:defRPr sz="900">
+              <a:defRPr sz="1200">
                 <a:solidFill>
                   <a:schemeClr val="tx1">
                     <a:tint val="75000"/>
@@ -2653,27 +2653,27 @@
     </p:spTree>
     <p:extLst>
       <p:ext uri="{BB962C8B-B14F-4D97-AF65-F5344CB8AC3E}">
-        <p14:creationId xmlns:p14="http://schemas.microsoft.com/office/powerpoint/2010/main" val="3351099531"/>
+        <p14:creationId xmlns:p14="http://schemas.microsoft.com/office/powerpoint/2010/main" val="2020460590"/>
       </p:ext>
     </p:extLst>
   </p:cSld>
   <p:clrMap bg1="lt1" tx1="dk1" bg2="lt2" tx2="dk2" accent1="accent1" accent2="accent2" accent3="accent3" accent4="accent4" accent5="accent5" accent6="accent6" hlink="hlink" folHlink="folHlink"/>
   <p:sldLayoutIdLst>
-    <p:sldLayoutId id="2147483697" r:id="rId1"/>
-    <p:sldLayoutId id="2147483698" r:id="rId2"/>
-    <p:sldLayoutId id="2147483699" r:id="rId3"/>
-    <p:sldLayoutId id="2147483700" r:id="rId4"/>
-    <p:sldLayoutId id="2147483701" r:id="rId5"/>
-    <p:sldLayoutId id="2147483702" r:id="rId6"/>
-    <p:sldLayoutId id="2147483703" r:id="rId7"/>
-    <p:sldLayoutId id="2147483704" r:id="rId8"/>
-    <p:sldLayoutId id="2147483705" r:id="rId9"/>
-    <p:sldLayoutId id="2147483706" r:id="rId10"/>
-    <p:sldLayoutId id="2147483707" r:id="rId11"/>
+    <p:sldLayoutId id="2147483757" r:id="rId1"/>
+    <p:sldLayoutId id="2147483758" r:id="rId2"/>
+    <p:sldLayoutId id="2147483759" r:id="rId3"/>
+    <p:sldLayoutId id="2147483760" r:id="rId4"/>
+    <p:sldLayoutId id="2147483761" r:id="rId5"/>
+    <p:sldLayoutId id="2147483762" r:id="rId6"/>
+    <p:sldLayoutId id="2147483763" r:id="rId7"/>
+    <p:sldLayoutId id="2147483764" r:id="rId8"/>
+    <p:sldLayoutId id="2147483765" r:id="rId9"/>
+    <p:sldLayoutId id="2147483766" r:id="rId10"/>
+    <p:sldLayoutId id="2147483767" r:id="rId11"/>
   </p:sldLayoutIdLst>
   <p:txStyles>
     <p:titleStyle>
-      <a:lvl1pPr algn="l" defTabSz="685800" rtl="0" eaLnBrk="1" latinLnBrk="0" hangingPunct="1">
+      <a:lvl1pPr algn="l" defTabSz="914400" rtl="0" eaLnBrk="1" latinLnBrk="0" hangingPunct="1">
         <a:lnSpc>
           <a:spcPct val="90000"/>
         </a:lnSpc>
@@ -2681,7 +2681,7 @@
           <a:spcPct val="0"/>
         </a:spcBef>
         <a:buNone/>
-        <a:defRPr sz="3300" kern="1200">
+        <a:defRPr sz="4400" kern="1200">
           <a:solidFill>
             <a:schemeClr val="tx1"/>
           </a:solidFill>
@@ -2692,16 +2692,16 @@
       </a:lvl1pPr>
     </p:titleStyle>
     <p:bodyStyle>
-      <a:lvl1pPr marL="171450" indent="-171450" algn="l" defTabSz="685800" rtl="0" eaLnBrk="1" latinLnBrk="0" hangingPunct="1">
+      <a:lvl1pPr marL="228600" indent="-228600" algn="l" defTabSz="914400" rtl="0" eaLnBrk="1" latinLnBrk="0" hangingPunct="1">
         <a:lnSpc>
           <a:spcPct val="90000"/>
         </a:lnSpc>
         <a:spcBef>
-          <a:spcPts val="750"/>
+          <a:spcPts val="1000"/>
         </a:spcBef>
         <a:buFont typeface="Arial" panose="020B0604020202020204" pitchFamily="34" charset="0"/>
         <a:buChar char="•"/>
-        <a:defRPr sz="2100" kern="1200">
+        <a:defRPr sz="2800" kern="1200">
           <a:solidFill>
             <a:schemeClr val="tx1"/>
           </a:solidFill>
@@ -2710,12 +2710,48 @@
           <a:cs typeface="+mn-cs"/>
         </a:defRPr>
       </a:lvl1pPr>
-      <a:lvl2pPr marL="514350" indent="-171450" algn="l" defTabSz="685800" rtl="0" eaLnBrk="1" latinLnBrk="0" hangingPunct="1">
+      <a:lvl2pPr marL="685800" indent="-228600" algn="l" defTabSz="914400" rtl="0" eaLnBrk="1" latinLnBrk="0" hangingPunct="1">
         <a:lnSpc>
           <a:spcPct val="90000"/>
         </a:lnSpc>
         <a:spcBef>
-          <a:spcPts val="375"/>
+          <a:spcPts val="500"/>
+        </a:spcBef>
+        <a:buFont typeface="Arial" panose="020B0604020202020204" pitchFamily="34" charset="0"/>
+        <a:buChar char="•"/>
+        <a:defRPr sz="2400" kern="1200">
+          <a:solidFill>
+            <a:schemeClr val="tx1"/>
+          </a:solidFill>
+          <a:latin typeface="+mn-lt"/>
+          <a:ea typeface="+mn-ea"/>
+          <a:cs typeface="+mn-cs"/>
+        </a:defRPr>
+      </a:lvl2pPr>
+      <a:lvl3pPr marL="1143000" indent="-228600" algn="l" defTabSz="914400" rtl="0" eaLnBrk="1" latinLnBrk="0" hangingPunct="1">
+        <a:lnSpc>
+          <a:spcPct val="90000"/>
+        </a:lnSpc>
+        <a:spcBef>
+          <a:spcPts val="500"/>
+        </a:spcBef>
+        <a:buFont typeface="Arial" panose="020B0604020202020204" pitchFamily="34" charset="0"/>
+        <a:buChar char="•"/>
+        <a:defRPr sz="2000" kern="1200">
+          <a:solidFill>
+            <a:schemeClr val="tx1"/>
+          </a:solidFill>
+          <a:latin typeface="+mn-lt"/>
+          <a:ea typeface="+mn-ea"/>
+          <a:cs typeface="+mn-cs"/>
+        </a:defRPr>
+      </a:lvl3pPr>
+      <a:lvl4pPr marL="1600200" indent="-228600" algn="l" defTabSz="914400" rtl="0" eaLnBrk="1" latinLnBrk="0" hangingPunct="1">
+        <a:lnSpc>
+          <a:spcPct val="90000"/>
+        </a:lnSpc>
+        <a:spcBef>
+          <a:spcPts val="500"/>
         </a:spcBef>
         <a:buFont typeface="Arial" panose="020B0604020202020204" pitchFamily="34" charset="0"/>
         <a:buChar char="•"/>
@@ -2727,53 +2763,17 @@
           <a:ea typeface="+mn-ea"/>
           <a:cs typeface="+mn-cs"/>
         </a:defRPr>
-      </a:lvl2pPr>
-      <a:lvl3pPr marL="857250" indent="-171450" algn="l" defTabSz="685800" rtl="0" eaLnBrk="1" latinLnBrk="0" hangingPunct="1">
+      </a:lvl4pPr>
+      <a:lvl5pPr marL="2057400" indent="-228600" algn="l" defTabSz="914400" rtl="0" eaLnBrk="1" latinLnBrk="0" hangingPunct="1">
         <a:lnSpc>
           <a:spcPct val="90000"/>
         </a:lnSpc>
         <a:spcBef>
-          <a:spcPts val="375"/>
+          <a:spcPts val="500"/>
         </a:spcBef>
         <a:buFont typeface="Arial" panose="020B0604020202020204" pitchFamily="34" charset="0"/>
         <a:buChar char="•"/>
-        <a:defRPr sz="1500" kern="1200">
-          <a:solidFill>
-            <a:schemeClr val="tx1"/>
-          </a:solidFill>
-          <a:latin typeface="+mn-lt"/>
-          <a:ea typeface="+mn-ea"/>
-          <a:cs typeface="+mn-cs"/>
-        </a:defRPr>
-      </a:lvl3pPr>
-      <a:lvl4pPr marL="1200150" indent="-171450" algn="l" defTabSz="685800" rtl="0" eaLnBrk="1" latinLnBrk="0" hangingPunct="1">
-        <a:lnSpc>
-          <a:spcPct val="90000"/>
-        </a:lnSpc>
-        <a:spcBef>
-          <a:spcPts val="375"/>
-        </a:spcBef>
-        <a:buFont typeface="Arial" panose="020B0604020202020204" pitchFamily="34" charset="0"/>
-        <a:buChar char="•"/>
-        <a:defRPr sz="1350" kern="1200">
-          <a:solidFill>
-            <a:schemeClr val="tx1"/>
-          </a:solidFill>
-          <a:latin typeface="+mn-lt"/>
-          <a:ea typeface="+mn-ea"/>
-          <a:cs typeface="+mn-cs"/>
-        </a:defRPr>
-      </a:lvl4pPr>
-      <a:lvl5pPr marL="1543050" indent="-171450" algn="l" defTabSz="685800" rtl="0" eaLnBrk="1" latinLnBrk="0" hangingPunct="1">
-        <a:lnSpc>
-          <a:spcPct val="90000"/>
-        </a:lnSpc>
-        <a:spcBef>
-          <a:spcPts val="375"/>
-        </a:spcBef>
-        <a:buFont typeface="Arial" panose="020B0604020202020204" pitchFamily="34" charset="0"/>
-        <a:buChar char="•"/>
-        <a:defRPr sz="1350" kern="1200">
+        <a:defRPr sz="1800" kern="1200">
           <a:solidFill>
             <a:schemeClr val="tx1"/>
           </a:solidFill>
@@ -2782,16 +2782,16 @@
           <a:cs typeface="+mn-cs"/>
         </a:defRPr>
       </a:lvl5pPr>
-      <a:lvl6pPr marL="1885950" indent="-171450" algn="l" defTabSz="685800" rtl="0" eaLnBrk="1" latinLnBrk="0" hangingPunct="1">
+      <a:lvl6pPr marL="2514600" indent="-228600" algn="l" defTabSz="914400" rtl="0" eaLnBrk="1" latinLnBrk="0" hangingPunct="1">
         <a:lnSpc>
           <a:spcPct val="90000"/>
         </a:lnSpc>
         <a:spcBef>
-          <a:spcPts val="375"/>
+          <a:spcPts val="500"/>
         </a:spcBef>
         <a:buFont typeface="Arial" panose="020B0604020202020204" pitchFamily="34" charset="0"/>
         <a:buChar char="•"/>
-        <a:defRPr sz="1350" kern="1200">
+        <a:defRPr sz="1800" kern="1200">
           <a:solidFill>
             <a:schemeClr val="tx1"/>
           </a:solidFill>
@@ -2800,16 +2800,16 @@
           <a:cs typeface="+mn-cs"/>
         </a:defRPr>
       </a:lvl6pPr>
-      <a:lvl7pPr marL="2228850" indent="-171450" algn="l" defTabSz="685800" rtl="0" eaLnBrk="1" latinLnBrk="0" hangingPunct="1">
+      <a:lvl7pPr marL="2971800" indent="-228600" algn="l" defTabSz="914400" rtl="0" eaLnBrk="1" latinLnBrk="0" hangingPunct="1">
         <a:lnSpc>
           <a:spcPct val="90000"/>
         </a:lnSpc>
         <a:spcBef>
-          <a:spcPts val="375"/>
+          <a:spcPts val="500"/>
         </a:spcBef>
         <a:buFont typeface="Arial" panose="020B0604020202020204" pitchFamily="34" charset="0"/>
         <a:buChar char="•"/>
-        <a:defRPr sz="1350" kern="1200">
+        <a:defRPr sz="1800" kern="1200">
           <a:solidFill>
             <a:schemeClr val="tx1"/>
           </a:solidFill>
@@ -2818,16 +2818,16 @@
           <a:cs typeface="+mn-cs"/>
         </a:defRPr>
       </a:lvl7pPr>
-      <a:lvl8pPr marL="2571750" indent="-171450" algn="l" defTabSz="685800" rtl="0" eaLnBrk="1" latinLnBrk="0" hangingPunct="1">
+      <a:lvl8pPr marL="3429000" indent="-228600" algn="l" defTabSz="914400" rtl="0" eaLnBrk="1" latinLnBrk="0" hangingPunct="1">
         <a:lnSpc>
           <a:spcPct val="90000"/>
         </a:lnSpc>
         <a:spcBef>
-          <a:spcPts val="375"/>
+          <a:spcPts val="500"/>
         </a:spcBef>
         <a:buFont typeface="Arial" panose="020B0604020202020204" pitchFamily="34" charset="0"/>
         <a:buChar char="•"/>
-        <a:defRPr sz="1350" kern="1200">
+        <a:defRPr sz="1800" kern="1200">
           <a:solidFill>
             <a:schemeClr val="tx1"/>
           </a:solidFill>
@@ -2836,16 +2836,16 @@
           <a:cs typeface="+mn-cs"/>
         </a:defRPr>
       </a:lvl8pPr>
-      <a:lvl9pPr marL="2914650" indent="-171450" algn="l" defTabSz="685800" rtl="0" eaLnBrk="1" latinLnBrk="0" hangingPunct="1">
+      <a:lvl9pPr marL="3886200" indent="-228600" algn="l" defTabSz="914400" rtl="0" eaLnBrk="1" latinLnBrk="0" hangingPunct="1">
         <a:lnSpc>
           <a:spcPct val="90000"/>
         </a:lnSpc>
         <a:spcBef>
-          <a:spcPts val="375"/>
+          <a:spcPts val="500"/>
         </a:spcBef>
         <a:buFont typeface="Arial" panose="020B0604020202020204" pitchFamily="34" charset="0"/>
         <a:buChar char="•"/>
-        <a:defRPr sz="1350" kern="1200">
+        <a:defRPr sz="1800" kern="1200">
           <a:solidFill>
             <a:schemeClr val="tx1"/>
           </a:solidFill>
@@ -2859,8 +2859,8 @@
       <a:defPPr>
         <a:defRPr lang="en-US"/>
       </a:defPPr>
-      <a:lvl1pPr marL="0" algn="l" defTabSz="685800" rtl="0" eaLnBrk="1" latinLnBrk="0" hangingPunct="1">
-        <a:defRPr sz="1350" kern="1200">
+      <a:lvl1pPr marL="0" algn="l" defTabSz="914400" rtl="0" eaLnBrk="1" latinLnBrk="0" hangingPunct="1">
+        <a:defRPr sz="1800" kern="1200">
           <a:solidFill>
             <a:schemeClr val="tx1"/>
           </a:solidFill>
@@ -2869,8 +2869,8 @@
           <a:cs typeface="+mn-cs"/>
         </a:defRPr>
       </a:lvl1pPr>
-      <a:lvl2pPr marL="342900" algn="l" defTabSz="685800" rtl="0" eaLnBrk="1" latinLnBrk="0" hangingPunct="1">
-        <a:defRPr sz="1350" kern="1200">
+      <a:lvl2pPr marL="457200" algn="l" defTabSz="914400" rtl="0" eaLnBrk="1" latinLnBrk="0" hangingPunct="1">
+        <a:defRPr sz="1800" kern="1200">
           <a:solidFill>
             <a:schemeClr val="tx1"/>
           </a:solidFill>
@@ -2879,8 +2879,8 @@
           <a:cs typeface="+mn-cs"/>
         </a:defRPr>
       </a:lvl2pPr>
-      <a:lvl3pPr marL="685800" algn="l" defTabSz="685800" rtl="0" eaLnBrk="1" latinLnBrk="0" hangingPunct="1">
-        <a:defRPr sz="1350" kern="1200">
+      <a:lvl3pPr marL="914400" algn="l" defTabSz="914400" rtl="0" eaLnBrk="1" latinLnBrk="0" hangingPunct="1">
+        <a:defRPr sz="1800" kern="1200">
           <a:solidFill>
             <a:schemeClr val="tx1"/>
           </a:solidFill>
@@ -2889,8 +2889,8 @@
           <a:cs typeface="+mn-cs"/>
         </a:defRPr>
       </a:lvl3pPr>
-      <a:lvl4pPr marL="1028700" algn="l" defTabSz="685800" rtl="0" eaLnBrk="1" latinLnBrk="0" hangingPunct="1">
-        <a:defRPr sz="1350" kern="1200">
+      <a:lvl4pPr marL="1371600" algn="l" defTabSz="914400" rtl="0" eaLnBrk="1" latinLnBrk="0" hangingPunct="1">
+        <a:defRPr sz="1800" kern="1200">
           <a:solidFill>
             <a:schemeClr val="tx1"/>
           </a:solidFill>
@@ -2899,8 +2899,8 @@
           <a:cs typeface="+mn-cs"/>
         </a:defRPr>
       </a:lvl4pPr>
-      <a:lvl5pPr marL="1371600" algn="l" defTabSz="685800" rtl="0" eaLnBrk="1" latinLnBrk="0" hangingPunct="1">
-        <a:defRPr sz="1350" kern="1200">
+      <a:lvl5pPr marL="1828800" algn="l" defTabSz="914400" rtl="0" eaLnBrk="1" latinLnBrk="0" hangingPunct="1">
+        <a:defRPr sz="1800" kern="1200">
           <a:solidFill>
             <a:schemeClr val="tx1"/>
           </a:solidFill>
@@ -2909,8 +2909,8 @@
           <a:cs typeface="+mn-cs"/>
         </a:defRPr>
       </a:lvl5pPr>
-      <a:lvl6pPr marL="1714500" algn="l" defTabSz="685800" rtl="0" eaLnBrk="1" latinLnBrk="0" hangingPunct="1">
-        <a:defRPr sz="1350" kern="1200">
+      <a:lvl6pPr marL="2286000" algn="l" defTabSz="914400" rtl="0" eaLnBrk="1" latinLnBrk="0" hangingPunct="1">
+        <a:defRPr sz="1800" kern="1200">
           <a:solidFill>
             <a:schemeClr val="tx1"/>
           </a:solidFill>
@@ -2919,8 +2919,8 @@
           <a:cs typeface="+mn-cs"/>
         </a:defRPr>
       </a:lvl6pPr>
-      <a:lvl7pPr marL="2057400" algn="l" defTabSz="685800" rtl="0" eaLnBrk="1" latinLnBrk="0" hangingPunct="1">
-        <a:defRPr sz="1350" kern="1200">
+      <a:lvl7pPr marL="2743200" algn="l" defTabSz="914400" rtl="0" eaLnBrk="1" latinLnBrk="0" hangingPunct="1">
+        <a:defRPr sz="1800" kern="1200">
           <a:solidFill>
             <a:schemeClr val="tx1"/>
           </a:solidFill>
@@ -2929,8 +2929,8 @@
           <a:cs typeface="+mn-cs"/>
         </a:defRPr>
       </a:lvl7pPr>
-      <a:lvl8pPr marL="2400300" algn="l" defTabSz="685800" rtl="0" eaLnBrk="1" latinLnBrk="0" hangingPunct="1">
-        <a:defRPr sz="1350" kern="1200">
+      <a:lvl8pPr marL="3200400" algn="l" defTabSz="914400" rtl="0" eaLnBrk="1" latinLnBrk="0" hangingPunct="1">
+        <a:defRPr sz="1800" kern="1200">
           <a:solidFill>
             <a:schemeClr val="tx1"/>
           </a:solidFill>
@@ -2939,8 +2939,8 @@
           <a:cs typeface="+mn-cs"/>
         </a:defRPr>
       </a:lvl8pPr>
-      <a:lvl9pPr marL="2743200" algn="l" defTabSz="685800" rtl="0" eaLnBrk="1" latinLnBrk="0" hangingPunct="1">
-        <a:defRPr sz="1350" kern="1200">
+      <a:lvl9pPr marL="3657600" algn="l" defTabSz="914400" rtl="0" eaLnBrk="1" latinLnBrk="0" hangingPunct="1">
+        <a:defRPr sz="1800" kern="1200">
           <a:solidFill>
             <a:schemeClr val="tx1"/>
           </a:solidFill>
@@ -2979,14 +2979,14 @@
         </p:nvSpPr>
         <p:spPr>
           <a:xfrm>
-            <a:off x="303592" y="163534"/>
-            <a:ext cx="2576869" cy="830997"/>
+            <a:off x="361950" y="510909"/>
+            <a:ext cx="3810000" cy="1200329"/>
           </a:xfrm>
           <a:prstGeom prst="rect">
             <a:avLst/>
           </a:prstGeom>
           <a:noFill/>
-          <a:ln>
+          <a:ln w="38100">
             <a:solidFill>
               <a:schemeClr val="tx2"/>
             </a:solidFill>
@@ -3000,7 +3000,7 @@
           <a:p>
             <a:pPr algn="ctr"/>
             <a:r>
-              <a:rPr lang="en-CA" sz="1600" dirty="0">
+              <a:rPr lang="en-CA" sz="2400" b="1" dirty="0">
                 <a:latin typeface="Times New Roman" charset="0"/>
                 <a:ea typeface="Times New Roman" charset="0"/>
                 <a:cs typeface="Times New Roman" charset="0"/>
@@ -3008,21 +3008,21 @@
               <a:t>Total of CHILDES corpora in 2021</a:t>
             </a:r>
             <a:br>
-              <a:rPr lang="en-CA" sz="1600" dirty="0">
+              <a:rPr lang="en-CA" sz="2400" b="1" dirty="0">
                 <a:latin typeface="Times New Roman" charset="0"/>
                 <a:ea typeface="Times New Roman" charset="0"/>
                 <a:cs typeface="Times New Roman" charset="0"/>
               </a:rPr>
             </a:br>
             <a:r>
-              <a:rPr lang="en-CA" sz="1600" dirty="0">
+              <a:rPr lang="en-CA" sz="2400" b="1" dirty="0">
                 <a:latin typeface="Times New Roman" charset="0"/>
                 <a:ea typeface="Times New Roman" charset="0"/>
                 <a:cs typeface="Times New Roman" charset="0"/>
               </a:rPr>
-              <a:t>(n = 426)</a:t>
-            </a:r>
-            <a:endParaRPr lang="en-US" sz="1600" dirty="0">
+              <a:t>(n = 430)</a:t>
+            </a:r>
+            <a:endParaRPr lang="en-US" sz="2400" b="1" dirty="0">
               <a:latin typeface="Times New Roman" charset="0"/>
               <a:ea typeface="Times New Roman" charset="0"/>
               <a:cs typeface="Times New Roman" charset="0"/>
@@ -3038,16 +3038,16 @@
         </p:nvSpPr>
         <p:spPr>
           <a:xfrm>
-            <a:off x="307525" y="2074834"/>
-            <a:ext cx="2569002" cy="584775"/>
+            <a:off x="361950" y="5058151"/>
+            <a:ext cx="3810000" cy="1200329"/>
           </a:xfrm>
           <a:prstGeom prst="rect">
             <a:avLst/>
           </a:prstGeom>
           <a:noFill/>
-          <a:ln>
+          <a:ln w="38100">
             <a:solidFill>
-              <a:schemeClr val="tx2"/>
+              <a:schemeClr val="tx1"/>
             </a:solidFill>
           </a:ln>
         </p:spPr>
@@ -3059,7 +3059,7 @@
           <a:p>
             <a:pPr algn="ctr"/>
             <a:r>
-              <a:rPr lang="en-CA" sz="1600" dirty="0">
+              <a:rPr lang="en-CA" sz="2400" b="1" dirty="0">
                 <a:latin typeface="Times New Roman" charset="0"/>
                 <a:ea typeface="Times New Roman" charset="0"/>
                 <a:cs typeface="Times New Roman" charset="0"/>
@@ -3070,14 +3070,14 @@
           <a:p>
             <a:pPr algn="ctr"/>
             <a:r>
-              <a:rPr lang="en-CA" sz="1600" dirty="0">
+              <a:rPr lang="en-CA" sz="2400" b="1" dirty="0">
                 <a:latin typeface="Times New Roman" charset="0"/>
                 <a:ea typeface="Times New Roman" charset="0"/>
                 <a:cs typeface="Times New Roman" charset="0"/>
               </a:rPr>
-              <a:t>(n = 321)</a:t>
-            </a:r>
-            <a:endParaRPr lang="en-US" sz="1600" dirty="0">
+              <a:t>(n = 324)</a:t>
+            </a:r>
+            <a:endParaRPr lang="en-US" sz="2400" b="1" dirty="0">
               <a:latin typeface="Times New Roman" charset="0"/>
               <a:ea typeface="Times New Roman" charset="0"/>
               <a:cs typeface="Times New Roman" charset="0"/>
@@ -3093,16 +3093,16 @@
         </p:nvSpPr>
         <p:spPr>
           <a:xfrm>
-            <a:off x="3230310" y="2087657"/>
-            <a:ext cx="3546500" cy="2062103"/>
+            <a:off x="4438651" y="6418364"/>
+            <a:ext cx="4286252" cy="3785652"/>
           </a:xfrm>
           <a:prstGeom prst="rect">
             <a:avLst/>
           </a:prstGeom>
           <a:noFill/>
-          <a:ln>
+          <a:ln w="38100">
             <a:solidFill>
-              <a:schemeClr val="tx2"/>
+              <a:schemeClr val="tx1"/>
             </a:solidFill>
           </a:ln>
         </p:spPr>
@@ -3114,7 +3114,7 @@
           <a:p>
             <a:pPr algn="ctr"/>
             <a:r>
-              <a:rPr lang="en-CA" sz="1600" dirty="0">
+              <a:rPr lang="en-CA" sz="2400" b="1" dirty="0">
                 <a:latin typeface="Times New Roman" charset="0"/>
                 <a:ea typeface="Times New Roman" charset="0"/>
                 <a:cs typeface="Times New Roman" charset="0"/>
@@ -3122,93 +3122,104 @@
               <a:t>Additional excluded corpora</a:t>
             </a:r>
             <a:br>
-              <a:rPr lang="en-CA" sz="1600" dirty="0">
+              <a:rPr lang="en-CA" sz="2400" b="1" dirty="0">
                 <a:latin typeface="Times New Roman" charset="0"/>
                 <a:ea typeface="Times New Roman" charset="0"/>
                 <a:cs typeface="Times New Roman" charset="0"/>
               </a:rPr>
             </a:br>
             <a:r>
-              <a:rPr lang="en-CA" sz="1600" dirty="0">
+              <a:rPr lang="en-CA" sz="2400" b="1" dirty="0">
                 <a:latin typeface="Times New Roman" charset="0"/>
                 <a:ea typeface="Times New Roman" charset="0"/>
                 <a:cs typeface="Times New Roman" charset="0"/>
               </a:rPr>
-              <a:t>(n=141)</a:t>
+              <a:t>(n=144)</a:t>
             </a:r>
             <a:br>
-              <a:rPr lang="en-CA" sz="1600" dirty="0">
+              <a:rPr lang="en-CA" sz="2400" dirty="0">
                 <a:latin typeface="Times New Roman" charset="0"/>
                 <a:ea typeface="Times New Roman" charset="0"/>
                 <a:cs typeface="Times New Roman" charset="0"/>
               </a:rPr>
             </a:br>
             <a:br>
-              <a:rPr lang="en-CA" sz="1600" dirty="0">
+              <a:rPr lang="en-CA" sz="2400" dirty="0">
                 <a:latin typeface="Times New Roman" charset="0"/>
                 <a:ea typeface="Times New Roman" charset="0"/>
                 <a:cs typeface="Times New Roman" charset="0"/>
               </a:rPr>
             </a:br>
             <a:r>
-              <a:rPr lang="en-CA" sz="1600" dirty="0">
+              <a:rPr lang="en-CA" sz="2400" dirty="0">
                 <a:latin typeface="Times New Roman" charset="0"/>
                 <a:ea typeface="Times New Roman" charset="0"/>
                 <a:cs typeface="Times New Roman" charset="0"/>
               </a:rPr>
-              <a:t>Clinical population (XX)</a:t>
+              <a:t>Clinical population (10)</a:t>
             </a:r>
           </a:p>
           <a:p>
             <a:pPr algn="ctr"/>
             <a:r>
-              <a:rPr lang="en-CA" sz="1600" dirty="0">
+              <a:rPr lang="en-CA" sz="2400" dirty="0">
                 <a:latin typeface="Times New Roman" charset="0"/>
                 <a:ea typeface="Times New Roman" charset="0"/>
                 <a:cs typeface="Times New Roman" charset="0"/>
               </a:rPr>
-              <a:t>Only child production transcribed (XX)</a:t>
+              <a:t>Only child production transcribed (19)</a:t>
             </a:r>
             <a:br>
-              <a:rPr lang="en-CA" sz="1600" dirty="0">
+              <a:rPr lang="en-CA" sz="2400" dirty="0">
                 <a:latin typeface="Times New Roman" charset="0"/>
                 <a:ea typeface="Times New Roman" charset="0"/>
                 <a:cs typeface="Times New Roman" charset="0"/>
               </a:rPr>
             </a:br>
             <a:r>
-              <a:rPr lang="en-CA" sz="1600" dirty="0">
+              <a:rPr lang="en-CA" sz="2400" dirty="0">
                 <a:latin typeface="Times New Roman" charset="0"/>
                 <a:ea typeface="Times New Roman" charset="0"/>
                 <a:cs typeface="Times New Roman" charset="0"/>
               </a:rPr>
-              <a:t>In lab/school setting (XX)</a:t>
+              <a:t>Not Naturalistic setting (26)</a:t>
             </a:r>
           </a:p>
           <a:p>
             <a:pPr algn="ctr"/>
             <a:r>
-              <a:rPr lang="en-CA" sz="1600" dirty="0">
+              <a:rPr lang="en-CA" sz="2400" dirty="0">
                 <a:latin typeface="Times New Roman" charset="0"/>
                 <a:ea typeface="Times New Roman" charset="0"/>
                 <a:cs typeface="Times New Roman" charset="0"/>
               </a:rPr>
-              <a:t>Diary studies (XX)</a:t>
+              <a:t>Diary studies (11)</a:t>
             </a:r>
             <a:br>
-              <a:rPr lang="en-CA" sz="1600" dirty="0">
+              <a:rPr lang="en-CA" sz="2400" dirty="0">
                 <a:latin typeface="Times New Roman" charset="0"/>
                 <a:ea typeface="Times New Roman" charset="0"/>
                 <a:cs typeface="Times New Roman" charset="0"/>
               </a:rPr>
             </a:br>
             <a:r>
-              <a:rPr lang="en-CA" sz="1600" dirty="0">
+              <a:rPr lang="en-CA" sz="2400" dirty="0">
                 <a:latin typeface="Times New Roman" charset="0"/>
                 <a:ea typeface="Times New Roman" charset="0"/>
                 <a:cs typeface="Times New Roman" charset="0"/>
               </a:rPr>
-              <a:t>Elicitation tasks (XX)</a:t>
+              <a:t>Elicitation tasks (67)</a:t>
+            </a:r>
+          </a:p>
+          <a:p>
+            <a:pPr algn="ctr"/>
+            <a:r>
+              <a:rPr lang="en-CA" sz="2400" dirty="0">
+                <a:latin typeface="Times New Roman" charset="0"/>
+                <a:ea typeface="Times New Roman" charset="0"/>
+                <a:cs typeface="Times New Roman" charset="0"/>
+              </a:rPr>
+              <a:t>Not available (11)</a:t>
             </a:r>
           </a:p>
         </p:txBody>
@@ -3221,16 +3232,16 @@
         </p:nvSpPr>
         <p:spPr>
           <a:xfrm>
-            <a:off x="356835" y="3368170"/>
-            <a:ext cx="2569002" cy="830997"/>
+            <a:off x="361950" y="10204016"/>
+            <a:ext cx="3810000" cy="1938992"/>
           </a:xfrm>
           <a:prstGeom prst="rect">
             <a:avLst/>
           </a:prstGeom>
           <a:noFill/>
-          <a:ln>
+          <a:ln w="38100">
             <a:solidFill>
-              <a:schemeClr val="tx2"/>
+              <a:schemeClr val="tx1"/>
             </a:solidFill>
           </a:ln>
         </p:spPr>
@@ -3242,7 +3253,7 @@
           <a:p>
             <a:pPr algn="ctr"/>
             <a:r>
-              <a:rPr lang="en-CA" sz="1600" dirty="0">
+              <a:rPr lang="en-CA" sz="2400" b="1" dirty="0">
                 <a:latin typeface="Times New Roman" charset="0"/>
                 <a:ea typeface="Times New Roman" charset="0"/>
                 <a:cs typeface="Times New Roman" charset="0"/>
@@ -3250,21 +3261,36 @@
               <a:t>Annotated corpora by curators</a:t>
             </a:r>
             <a:br>
-              <a:rPr lang="en-CA" sz="1600" dirty="0">
+              <a:rPr lang="en-CA" sz="2400" b="1" dirty="0">
                 <a:latin typeface="Times New Roman" charset="0"/>
                 <a:ea typeface="Times New Roman" charset="0"/>
                 <a:cs typeface="Times New Roman" charset="0"/>
               </a:rPr>
             </a:br>
             <a:r>
-              <a:rPr lang="en-CA" sz="1600" dirty="0">
+              <a:rPr lang="en-CA" sz="2400" b="1" dirty="0">
                 <a:latin typeface="Times New Roman" charset="0"/>
                 <a:ea typeface="Times New Roman" charset="0"/>
                 <a:cs typeface="Times New Roman" charset="0"/>
               </a:rPr>
-              <a:t>(n = 180)</a:t>
-            </a:r>
-            <a:endParaRPr lang="en-US" sz="1600" dirty="0">
+              <a:t>180 corpora from</a:t>
+            </a:r>
+            <a:br>
+              <a:rPr lang="en-CA" sz="2400" b="1" dirty="0">
+                <a:latin typeface="Times New Roman" charset="0"/>
+                <a:ea typeface="Times New Roman" charset="0"/>
+                <a:cs typeface="Times New Roman" charset="0"/>
+              </a:rPr>
+            </a:br>
+            <a:r>
+              <a:rPr lang="en-CA" sz="2400" b="1" dirty="0">
+                <a:latin typeface="Times New Roman" charset="0"/>
+                <a:ea typeface="Times New Roman" charset="0"/>
+                <a:cs typeface="Times New Roman" charset="0"/>
+              </a:rPr>
+              <a:t>48 different countries or territories</a:t>
+            </a:r>
+            <a:endParaRPr lang="en-US" sz="2400" b="1" dirty="0">
               <a:latin typeface="Times New Roman" charset="0"/>
               <a:ea typeface="Times New Roman" charset="0"/>
               <a:cs typeface="Times New Roman" charset="0"/>
@@ -3274,22 +3300,28 @@
       </p:sp>
       <p:sp>
         <p:nvSpPr>
-          <p:cNvPr id="15" name="TextBox 14"/>
+          <p:cNvPr id="26" name="TextBox 25">
+            <a:extLst>
+              <a:ext uri="{FF2B5EF4-FFF2-40B4-BE49-F238E27FC236}">
+                <a16:creationId xmlns:a16="http://schemas.microsoft.com/office/drawing/2014/main" id="{BF0783AE-C036-5041-AB67-5CF7A1213B50}"/>
+              </a:ext>
+            </a:extLst>
+          </p:cNvPr>
           <p:cNvSpPr txBox="1"/>
           <p:nvPr/>
         </p:nvSpPr>
         <p:spPr>
           <a:xfrm>
-            <a:off x="425717" y="4939517"/>
-            <a:ext cx="2563592" cy="830997"/>
+            <a:off x="4438651" y="1982437"/>
+            <a:ext cx="4286251" cy="2677656"/>
           </a:xfrm>
           <a:prstGeom prst="rect">
             <a:avLst/>
           </a:prstGeom>
           <a:noFill/>
-          <a:ln>
+          <a:ln w="38100">
             <a:solidFill>
-              <a:schemeClr val="tx2"/>
+              <a:schemeClr val="tx1"/>
             </a:solidFill>
           </a:ln>
         </p:spPr>
@@ -3301,125 +3333,121 @@
           <a:p>
             <a:pPr algn="ctr"/>
             <a:r>
-              <a:rPr lang="en-US" sz="1600" dirty="0">
+              <a:rPr lang="en-CA" sz="2400" b="1" dirty="0">
                 <a:latin typeface="Times New Roman" charset="0"/>
                 <a:ea typeface="Times New Roman" charset="0"/>
                 <a:cs typeface="Times New Roman" charset="0"/>
               </a:rPr>
-              <a:t>Country level analysis</a:t>
+              <a:t>Initial excluded corpora</a:t>
             </a:r>
             <a:br>
-              <a:rPr lang="en-CA" sz="1600" dirty="0">
+              <a:rPr lang="en-CA" sz="2400" b="1" dirty="0">
                 <a:latin typeface="Times New Roman" charset="0"/>
                 <a:ea typeface="Times New Roman" charset="0"/>
                 <a:cs typeface="Times New Roman" charset="0"/>
               </a:rPr>
             </a:br>
             <a:r>
-              <a:rPr lang="en-CA" sz="1600" dirty="0">
+              <a:rPr lang="en-CA" sz="2400" b="1" dirty="0">
                 <a:latin typeface="Times New Roman" charset="0"/>
                 <a:ea typeface="Times New Roman" charset="0"/>
                 <a:cs typeface="Times New Roman" charset="0"/>
               </a:rPr>
-              <a:t>(n = 180 corpora </a:t>
-            </a:r>
-          </a:p>
-          <a:p>
-            <a:pPr algn="ctr"/>
-            <a:r>
-              <a:rPr lang="en-CA" sz="1600" dirty="0">
-                <a:latin typeface="Times New Roman" charset="0"/>
-                <a:ea typeface="Times New Roman" charset="0"/>
-                <a:cs typeface="Times New Roman" charset="0"/>
-              </a:rPr>
-              <a:t>N= 49 different countries)</a:t>
-            </a:r>
-            <a:endParaRPr lang="en-US" sz="1600" dirty="0">
-              <a:latin typeface="Times New Roman" charset="0"/>
-              <a:ea typeface="Times New Roman" charset="0"/>
-              <a:cs typeface="Times New Roman" charset="0"/>
-            </a:endParaRPr>
-          </a:p>
-        </p:txBody>
-      </p:sp>
-      <p:sp>
-        <p:nvSpPr>
-          <p:cNvPr id="16" name="TextBox 15"/>
-          <p:cNvSpPr txBox="1"/>
-          <p:nvPr/>
-        </p:nvSpPr>
-        <p:spPr>
-          <a:xfrm>
-            <a:off x="450967" y="6004901"/>
-            <a:ext cx="2576869" cy="830997"/>
-          </a:xfrm>
-          <a:prstGeom prst="rect">
-            <a:avLst/>
-          </a:prstGeom>
-          <a:solidFill>
-            <a:schemeClr val="accent2">
-              <a:lumMod val="20000"/>
-              <a:lumOff val="80000"/>
-            </a:schemeClr>
-          </a:solidFill>
-          <a:ln>
-            <a:solidFill>
-              <a:schemeClr val="tx2"/>
-            </a:solidFill>
-          </a:ln>
-        </p:spPr>
-        <p:txBody>
-          <a:bodyPr wrap="square" rtlCol="0">
-            <a:spAutoFit/>
-          </a:bodyPr>
-          <a:lstStyle/>
-          <a:p>
-            <a:pPr algn="ctr"/>
-            <a:r>
-              <a:rPr lang="en-US" sz="1600" dirty="0">
-                <a:latin typeface="Times New Roman" charset="0"/>
-                <a:ea typeface="Times New Roman" charset="0"/>
-                <a:cs typeface="Times New Roman" charset="0"/>
-              </a:rPr>
-              <a:t>% completed lower secondary school  </a:t>
+              <a:t>(n = 106)</a:t>
             </a:r>
             <a:br>
-              <a:rPr lang="en-US" sz="1600" dirty="0">
+              <a:rPr lang="en-CA" sz="2400" dirty="0">
                 <a:latin typeface="Times New Roman" charset="0"/>
                 <a:ea typeface="Times New Roman" charset="0"/>
                 <a:cs typeface="Times New Roman" charset="0"/>
               </a:rPr>
             </a:br>
             <a:r>
-              <a:rPr lang="en-US" sz="1600" dirty="0">
+              <a:rPr lang="en-CA" sz="2400" dirty="0">
                 <a:latin typeface="Times New Roman" charset="0"/>
                 <a:ea typeface="Times New Roman" charset="0"/>
                 <a:cs typeface="Times New Roman" charset="0"/>
               </a:rPr>
-              <a:t>(n=114 | N=)</a:t>
+              <a:t> </a:t>
+            </a:r>
+          </a:p>
+          <a:p>
+            <a:pPr algn="ctr"/>
+            <a:r>
+              <a:rPr lang="en-CA" sz="2400" dirty="0">
+                <a:latin typeface="Times New Roman" charset="0"/>
+                <a:ea typeface="Times New Roman" charset="0"/>
+                <a:cs typeface="Times New Roman" charset="0"/>
+              </a:rPr>
+              <a:t>Narrative (14)</a:t>
+            </a:r>
+            <a:br>
+              <a:rPr lang="en-CA" sz="2400" dirty="0">
+                <a:latin typeface="Times New Roman" charset="0"/>
+                <a:ea typeface="Times New Roman" charset="0"/>
+                <a:cs typeface="Times New Roman" charset="0"/>
+              </a:rPr>
+            </a:br>
+            <a:r>
+              <a:rPr lang="en-CA" sz="2400" dirty="0">
+                <a:latin typeface="Times New Roman" charset="0"/>
+                <a:ea typeface="Times New Roman" charset="0"/>
+                <a:cs typeface="Times New Roman" charset="0"/>
+              </a:rPr>
+              <a:t>Frog Stories (33)</a:t>
+            </a:r>
+          </a:p>
+          <a:p>
+            <a:pPr algn="ctr"/>
+            <a:r>
+              <a:rPr lang="en-CA" sz="2400" dirty="0">
+                <a:latin typeface="Times New Roman" charset="0"/>
+                <a:ea typeface="Times New Roman" charset="0"/>
+                <a:cs typeface="Times New Roman" charset="0"/>
+              </a:rPr>
+              <a:t>Clinical (22)</a:t>
+            </a:r>
+          </a:p>
+          <a:p>
+            <a:pPr algn="ctr"/>
+            <a:r>
+              <a:rPr lang="en-CA" sz="2400" dirty="0">
+                <a:latin typeface="Times New Roman" charset="0"/>
+                <a:ea typeface="Times New Roman" charset="0"/>
+                <a:cs typeface="Times New Roman" charset="0"/>
+              </a:rPr>
+              <a:t>Clinical-MOR (37)</a:t>
             </a:r>
           </a:p>
         </p:txBody>
       </p:sp>
       <p:cxnSp>
         <p:nvCxnSpPr>
-          <p:cNvPr id="5" name="Straight Arrow Connector 4"/>
+          <p:cNvPr id="36" name="Elbow Connector 35">
+            <a:extLst>
+              <a:ext uri="{FF2B5EF4-FFF2-40B4-BE49-F238E27FC236}">
+                <a16:creationId xmlns:a16="http://schemas.microsoft.com/office/drawing/2014/main" id="{3A0347E8-069D-376D-25E8-DB47E7C20597}"/>
+              </a:ext>
+            </a:extLst>
+          </p:cNvPr>
           <p:cNvCxnSpPr>
-            <a:cxnSpLocks/>
-            <a:stCxn id="8" idx="2"/>
-            <a:endCxn id="12" idx="0"/>
+            <a:stCxn id="8" idx="3"/>
+            <a:endCxn id="26" idx="0"/>
           </p:cNvCxnSpPr>
           <p:nvPr/>
         </p:nvCxnSpPr>
         <p:spPr>
-          <a:xfrm flipH="1">
-            <a:off x="1592026" y="994531"/>
-            <a:ext cx="1" cy="1080303"/>
+          <a:xfrm>
+            <a:off x="4171950" y="1111074"/>
+            <a:ext cx="2409827" cy="871363"/>
           </a:xfrm>
-          <a:prstGeom prst="straightConnector1">
+          <a:prstGeom prst="bentConnector2">
             <a:avLst/>
           </a:prstGeom>
-          <a:ln>
+          <a:ln w="28575">
+            <a:solidFill>
+              <a:schemeClr val="tx1"/>
+            </a:solidFill>
             <a:tailEnd type="triangle"/>
           </a:ln>
         </p:spPr>
@@ -3440,23 +3468,30 @@
       </p:cxnSp>
       <p:cxnSp>
         <p:nvCxnSpPr>
-          <p:cNvPr id="23" name="Straight Arrow Connector 22"/>
+          <p:cNvPr id="38" name="Straight Arrow Connector 37">
+            <a:extLst>
+              <a:ext uri="{FF2B5EF4-FFF2-40B4-BE49-F238E27FC236}">
+                <a16:creationId xmlns:a16="http://schemas.microsoft.com/office/drawing/2014/main" id="{7BECF41C-A781-3F3C-8AF9-855127A30405}"/>
+              </a:ext>
+            </a:extLst>
+          </p:cNvPr>
           <p:cNvCxnSpPr>
-            <a:cxnSpLocks/>
-            <a:stCxn id="8" idx="3"/>
-            <a:endCxn id="26" idx="1"/>
+            <a:stCxn id="8" idx="2"/>
           </p:cNvCxnSpPr>
           <p:nvPr/>
         </p:nvCxnSpPr>
         <p:spPr>
           <a:xfrm>
-            <a:off x="2880461" y="579033"/>
-            <a:ext cx="358395" cy="536511"/>
+            <a:off x="2266950" y="1711238"/>
+            <a:ext cx="0" cy="3346913"/>
           </a:xfrm>
           <a:prstGeom prst="straightConnector1">
             <a:avLst/>
           </a:prstGeom>
-          <a:ln>
+          <a:ln w="28575">
+            <a:solidFill>
+              <a:schemeClr val="tx1"/>
+            </a:solidFill>
             <a:tailEnd type="triangle"/>
           </a:ln>
         </p:spPr>
@@ -3477,189 +3512,31 @@
       </p:cxnSp>
       <p:cxnSp>
         <p:nvCxnSpPr>
-          <p:cNvPr id="29" name="Straight Arrow Connector 28"/>
-          <p:cNvCxnSpPr>
-            <a:cxnSpLocks/>
-            <a:stCxn id="12" idx="3"/>
-            <a:endCxn id="13" idx="1"/>
-          </p:cNvCxnSpPr>
-          <p:nvPr/>
-        </p:nvCxnSpPr>
-        <p:spPr>
-          <a:xfrm>
-            <a:off x="2876527" y="2367222"/>
-            <a:ext cx="353783" cy="751487"/>
-          </a:xfrm>
-          <a:prstGeom prst="straightConnector1">
-            <a:avLst/>
-          </a:prstGeom>
-          <a:ln>
-            <a:tailEnd type="triangle"/>
-          </a:ln>
-        </p:spPr>
-        <p:style>
-          <a:lnRef idx="1">
-            <a:schemeClr val="accent1"/>
-          </a:lnRef>
-          <a:fillRef idx="0">
-            <a:schemeClr val="accent1"/>
-          </a:fillRef>
-          <a:effectRef idx="0">
-            <a:schemeClr val="accent1"/>
-          </a:effectRef>
-          <a:fontRef idx="minor">
-            <a:schemeClr val="tx1"/>
-          </a:fontRef>
-        </p:style>
-      </p:cxnSp>
-      <p:sp>
-        <p:nvSpPr>
-          <p:cNvPr id="26" name="TextBox 25">
+          <p:cNvPr id="39" name="Straight Arrow Connector 38">
             <a:extLst>
               <a:ext uri="{FF2B5EF4-FFF2-40B4-BE49-F238E27FC236}">
-                <a16:creationId xmlns:a16="http://schemas.microsoft.com/office/drawing/2014/main" id="{BF0783AE-C036-5041-AB67-5CF7A1213B50}"/>
-              </a:ext>
-            </a:extLst>
-          </p:cNvPr>
-          <p:cNvSpPr txBox="1"/>
-          <p:nvPr/>
-        </p:nvSpPr>
-        <p:spPr>
-          <a:xfrm>
-            <a:off x="3238856" y="207603"/>
-            <a:ext cx="3537954" cy="1815882"/>
-          </a:xfrm>
-          <a:prstGeom prst="rect">
-            <a:avLst/>
-          </a:prstGeom>
-          <a:noFill/>
-          <a:ln>
-            <a:solidFill>
-              <a:schemeClr val="tx2"/>
-            </a:solidFill>
-          </a:ln>
-        </p:spPr>
-        <p:txBody>
-          <a:bodyPr wrap="square" rtlCol="0">
-            <a:spAutoFit/>
-          </a:bodyPr>
-          <a:lstStyle/>
-          <a:p>
-            <a:pPr algn="ctr"/>
-            <a:r>
-              <a:rPr lang="en-CA" sz="1600" dirty="0">
-                <a:latin typeface="Times New Roman" charset="0"/>
-                <a:ea typeface="Times New Roman" charset="0"/>
-                <a:cs typeface="Times New Roman" charset="0"/>
-              </a:rPr>
-              <a:t>Initial excluded corpora</a:t>
-            </a:r>
-            <a:br>
-              <a:rPr lang="en-CA" sz="1600" dirty="0">
-                <a:latin typeface="Times New Roman" charset="0"/>
-                <a:ea typeface="Times New Roman" charset="0"/>
-                <a:cs typeface="Times New Roman" charset="0"/>
-              </a:rPr>
-            </a:br>
-            <a:r>
-              <a:rPr lang="en-CA" sz="1600" dirty="0">
-                <a:latin typeface="Times New Roman" charset="0"/>
-                <a:ea typeface="Times New Roman" charset="0"/>
-                <a:cs typeface="Times New Roman" charset="0"/>
-              </a:rPr>
-              <a:t>(n = 105)</a:t>
-            </a:r>
-            <a:br>
-              <a:rPr lang="en-CA" sz="1600" dirty="0">
-                <a:latin typeface="Times New Roman" charset="0"/>
-                <a:ea typeface="Times New Roman" charset="0"/>
-                <a:cs typeface="Times New Roman" charset="0"/>
-              </a:rPr>
-            </a:br>
-            <a:r>
-              <a:rPr lang="en-CA" sz="1600" dirty="0">
-                <a:latin typeface="Times New Roman" charset="0"/>
-                <a:ea typeface="Times New Roman" charset="0"/>
-                <a:cs typeface="Times New Roman" charset="0"/>
-              </a:rPr>
-              <a:t> </a:t>
-            </a:r>
-          </a:p>
-          <a:p>
-            <a:pPr algn="ctr"/>
-            <a:r>
-              <a:rPr lang="en-CA" sz="1600" dirty="0">
-                <a:latin typeface="Times New Roman" charset="0"/>
-                <a:ea typeface="Times New Roman" charset="0"/>
-                <a:cs typeface="Times New Roman" charset="0"/>
-              </a:rPr>
-              <a:t>Narrative (XX)</a:t>
-            </a:r>
-            <a:br>
-              <a:rPr lang="en-CA" sz="1600" dirty="0">
-                <a:latin typeface="Times New Roman" charset="0"/>
-                <a:ea typeface="Times New Roman" charset="0"/>
-                <a:cs typeface="Times New Roman" charset="0"/>
-              </a:rPr>
-            </a:br>
-            <a:r>
-              <a:rPr lang="en-CA" sz="1600" dirty="0">
-                <a:latin typeface="Times New Roman" charset="0"/>
-                <a:ea typeface="Times New Roman" charset="0"/>
-                <a:cs typeface="Times New Roman" charset="0"/>
-              </a:rPr>
-              <a:t>Frog Stories (XX)</a:t>
-            </a:r>
-          </a:p>
-          <a:p>
-            <a:pPr algn="ctr"/>
-            <a:r>
-              <a:rPr lang="en-CA" sz="1600" dirty="0">
-                <a:latin typeface="Times New Roman" charset="0"/>
-                <a:ea typeface="Times New Roman" charset="0"/>
-                <a:cs typeface="Times New Roman" charset="0"/>
-              </a:rPr>
-              <a:t>Clinical (XX)</a:t>
-            </a:r>
-          </a:p>
-          <a:p>
-            <a:pPr algn="ctr"/>
-            <a:r>
-              <a:rPr lang="en-CA" sz="1600" dirty="0">
-                <a:latin typeface="Times New Roman" charset="0"/>
-                <a:ea typeface="Times New Roman" charset="0"/>
-                <a:cs typeface="Times New Roman" charset="0"/>
-              </a:rPr>
-              <a:t>Clinical-MOR (XX)</a:t>
-            </a:r>
-          </a:p>
-        </p:txBody>
-      </p:sp>
-      <p:cxnSp>
-        <p:nvCxnSpPr>
-          <p:cNvPr id="34" name="Straight Arrow Connector 33">
-            <a:extLst>
-              <a:ext uri="{FF2B5EF4-FFF2-40B4-BE49-F238E27FC236}">
-                <a16:creationId xmlns:a16="http://schemas.microsoft.com/office/drawing/2014/main" id="{2E9253E5-321C-DD4C-A9A7-71DA440E9385}"/>
+                <a16:creationId xmlns:a16="http://schemas.microsoft.com/office/drawing/2014/main" id="{F8EA5E1B-650B-B090-6CA8-4CA4723A03E7}"/>
               </a:ext>
             </a:extLst>
           </p:cNvPr>
           <p:cNvCxnSpPr>
             <a:cxnSpLocks/>
-            <a:stCxn id="12" idx="2"/>
             <a:endCxn id="14" idx="0"/>
           </p:cNvCxnSpPr>
           <p:nvPr/>
         </p:nvCxnSpPr>
         <p:spPr>
           <a:xfrm>
-            <a:off x="1592026" y="2659609"/>
-            <a:ext cx="49310" cy="708561"/>
+            <a:off x="2266950" y="6258480"/>
+            <a:ext cx="0" cy="3945536"/>
           </a:xfrm>
           <a:prstGeom prst="straightConnector1">
             <a:avLst/>
           </a:prstGeom>
-          <a:ln>
+          <a:ln w="28575">
+            <a:solidFill>
+              <a:schemeClr val="tx1"/>
+            </a:solidFill>
             <a:tailEnd type="triangle"/>
           </a:ln>
         </p:spPr>
@@ -3680,1429 +3557,34 @@
       </p:cxnSp>
       <p:cxnSp>
         <p:nvCxnSpPr>
-          <p:cNvPr id="43" name="Straight Arrow Connector 42">
+          <p:cNvPr id="42" name="Elbow Connector 41">
             <a:extLst>
               <a:ext uri="{FF2B5EF4-FFF2-40B4-BE49-F238E27FC236}">
-                <a16:creationId xmlns:a16="http://schemas.microsoft.com/office/drawing/2014/main" id="{CBFDB707-A589-FD4C-BBF4-9C063565C41C}"/>
+                <a16:creationId xmlns:a16="http://schemas.microsoft.com/office/drawing/2014/main" id="{C159FB2F-7FB1-01A7-57DD-05D1BA0F65F6}"/>
               </a:ext>
             </a:extLst>
           </p:cNvPr>
           <p:cNvCxnSpPr>
             <a:cxnSpLocks/>
-            <a:stCxn id="14" idx="2"/>
-            <a:endCxn id="15" idx="0"/>
+            <a:stCxn id="12" idx="3"/>
+            <a:endCxn id="13" idx="0"/>
           </p:cNvCxnSpPr>
           <p:nvPr/>
         </p:nvCxnSpPr>
         <p:spPr>
           <a:xfrm>
-            <a:off x="1641336" y="4199167"/>
-            <a:ext cx="66177" cy="740350"/>
+            <a:off x="4171950" y="5658316"/>
+            <a:ext cx="2409827" cy="760048"/>
           </a:xfrm>
-          <a:prstGeom prst="straightConnector1">
+          <a:prstGeom prst="bentConnector2">
             <a:avLst/>
           </a:prstGeom>
-          <a:ln>
+          <a:ln w="28575">
+            <a:solidFill>
+              <a:schemeClr val="tx1"/>
+            </a:solidFill>
             <a:tailEnd type="triangle"/>
           </a:ln>
-        </p:spPr>
-        <p:style>
-          <a:lnRef idx="1">
-            <a:schemeClr val="accent1"/>
-          </a:lnRef>
-          <a:fillRef idx="0">
-            <a:schemeClr val="accent1"/>
-          </a:fillRef>
-          <a:effectRef idx="0">
-            <a:schemeClr val="accent1"/>
-          </a:effectRef>
-          <a:fontRef idx="minor">
-            <a:schemeClr val="tx1"/>
-          </a:fontRef>
-        </p:style>
-      </p:cxnSp>
-      <p:sp>
-        <p:nvSpPr>
-          <p:cNvPr id="54" name="TextBox 53">
-            <a:extLst>
-              <a:ext uri="{FF2B5EF4-FFF2-40B4-BE49-F238E27FC236}">
-                <a16:creationId xmlns:a16="http://schemas.microsoft.com/office/drawing/2014/main" id="{7127155A-3051-E440-8016-4C3ADA7552E3}"/>
-              </a:ext>
-            </a:extLst>
-          </p:cNvPr>
-          <p:cNvSpPr txBox="1"/>
-          <p:nvPr/>
-        </p:nvSpPr>
-        <p:spPr>
-          <a:xfrm>
-            <a:off x="3876626" y="4939517"/>
-            <a:ext cx="2563592" cy="584775"/>
-          </a:xfrm>
-          <a:prstGeom prst="rect">
-            <a:avLst/>
-          </a:prstGeom>
-          <a:noFill/>
-          <a:ln>
-            <a:solidFill>
-              <a:schemeClr val="tx2"/>
-            </a:solidFill>
-          </a:ln>
-        </p:spPr>
-        <p:txBody>
-          <a:bodyPr wrap="square" rtlCol="0">
-            <a:spAutoFit/>
-          </a:bodyPr>
-          <a:lstStyle/>
-          <a:p>
-            <a:pPr algn="ctr"/>
-            <a:r>
-              <a:rPr lang="en-US" sz="1600" dirty="0">
-                <a:latin typeface="Times New Roman" charset="0"/>
-                <a:ea typeface="Times New Roman" charset="0"/>
-                <a:cs typeface="Times New Roman" charset="0"/>
-              </a:rPr>
-              <a:t>Corpus level analysis</a:t>
-            </a:r>
-          </a:p>
-          <a:p>
-            <a:pPr algn="ctr"/>
-            <a:r>
-              <a:rPr lang="en-US" sz="1600" dirty="0">
-                <a:latin typeface="Times New Roman" charset="0"/>
-                <a:ea typeface="Times New Roman" charset="0"/>
-                <a:cs typeface="Times New Roman" charset="0"/>
-              </a:rPr>
-              <a:t>(n=180)</a:t>
-            </a:r>
-          </a:p>
-        </p:txBody>
-      </p:sp>
-      <p:sp>
-        <p:nvSpPr>
-          <p:cNvPr id="55" name="TextBox 54">
-            <a:extLst>
-              <a:ext uri="{FF2B5EF4-FFF2-40B4-BE49-F238E27FC236}">
-                <a16:creationId xmlns:a16="http://schemas.microsoft.com/office/drawing/2014/main" id="{F36911D0-A08D-6E44-930C-1A020A3210B6}"/>
-              </a:ext>
-            </a:extLst>
-          </p:cNvPr>
-          <p:cNvSpPr txBox="1"/>
-          <p:nvPr/>
-        </p:nvSpPr>
-        <p:spPr>
-          <a:xfrm>
-            <a:off x="450899" y="6868427"/>
-            <a:ext cx="2576869" cy="584775"/>
-          </a:xfrm>
-          <a:prstGeom prst="rect">
-            <a:avLst/>
-          </a:prstGeom>
-          <a:solidFill>
-            <a:schemeClr val="accent4">
-              <a:lumMod val="20000"/>
-              <a:lumOff val="80000"/>
-            </a:schemeClr>
-          </a:solidFill>
-          <a:ln>
-            <a:solidFill>
-              <a:schemeClr val="tx2"/>
-            </a:solidFill>
-          </a:ln>
-        </p:spPr>
-        <p:txBody>
-          <a:bodyPr wrap="square" rtlCol="0">
-            <a:spAutoFit/>
-          </a:bodyPr>
-          <a:lstStyle/>
-          <a:p>
-            <a:pPr algn="ctr"/>
-            <a:r>
-              <a:rPr lang="en-US" sz="1600" dirty="0">
-                <a:latin typeface="Times New Roman" charset="0"/>
-                <a:ea typeface="Times New Roman" charset="0"/>
-                <a:cs typeface="Times New Roman" charset="0"/>
-              </a:rPr>
-              <a:t>% urban  </a:t>
-            </a:r>
-            <a:br>
-              <a:rPr lang="en-US" sz="1600" dirty="0">
-                <a:latin typeface="Times New Roman" charset="0"/>
-                <a:ea typeface="Times New Roman" charset="0"/>
-                <a:cs typeface="Times New Roman" charset="0"/>
-              </a:rPr>
-            </a:br>
-            <a:r>
-              <a:rPr lang="en-US" sz="1600" dirty="0">
-                <a:latin typeface="Times New Roman" charset="0"/>
-                <a:ea typeface="Times New Roman" charset="0"/>
-                <a:cs typeface="Times New Roman" charset="0"/>
-              </a:rPr>
-              <a:t>(n=175 | N=)</a:t>
-            </a:r>
-          </a:p>
-        </p:txBody>
-      </p:sp>
-      <p:sp>
-        <p:nvSpPr>
-          <p:cNvPr id="56" name="TextBox 55">
-            <a:extLst>
-              <a:ext uri="{FF2B5EF4-FFF2-40B4-BE49-F238E27FC236}">
-                <a16:creationId xmlns:a16="http://schemas.microsoft.com/office/drawing/2014/main" id="{A2CCE5DE-EA4D-FA45-B401-EAEF02FE9AF8}"/>
-              </a:ext>
-            </a:extLst>
-          </p:cNvPr>
-          <p:cNvSpPr txBox="1"/>
-          <p:nvPr/>
-        </p:nvSpPr>
-        <p:spPr>
-          <a:xfrm>
-            <a:off x="462039" y="7479750"/>
-            <a:ext cx="2576869" cy="584775"/>
-          </a:xfrm>
-          <a:prstGeom prst="rect">
-            <a:avLst/>
-          </a:prstGeom>
-          <a:solidFill>
-            <a:schemeClr val="accent6">
-              <a:lumMod val="20000"/>
-              <a:lumOff val="80000"/>
-            </a:schemeClr>
-          </a:solidFill>
-          <a:ln>
-            <a:solidFill>
-              <a:schemeClr val="tx2"/>
-            </a:solidFill>
-          </a:ln>
-        </p:spPr>
-        <p:txBody>
-          <a:bodyPr wrap="square" rtlCol="0">
-            <a:spAutoFit/>
-          </a:bodyPr>
-          <a:lstStyle/>
-          <a:p>
-            <a:pPr algn="ctr"/>
-            <a:r>
-              <a:rPr lang="en-US" sz="1600" dirty="0">
-                <a:latin typeface="Times New Roman" charset="0"/>
-                <a:ea typeface="Times New Roman" charset="0"/>
-                <a:cs typeface="Times New Roman" charset="0"/>
-              </a:rPr>
-              <a:t>GDP per capita  </a:t>
-            </a:r>
-            <a:br>
-              <a:rPr lang="en-US" sz="1600" dirty="0">
-                <a:latin typeface="Times New Roman" charset="0"/>
-                <a:ea typeface="Times New Roman" charset="0"/>
-                <a:cs typeface="Times New Roman" charset="0"/>
-              </a:rPr>
-            </a:br>
-            <a:r>
-              <a:rPr lang="en-US" sz="1600" dirty="0">
-                <a:latin typeface="Times New Roman" charset="0"/>
-                <a:ea typeface="Times New Roman" charset="0"/>
-                <a:cs typeface="Times New Roman" charset="0"/>
-              </a:rPr>
-              <a:t>(n=175 | N= )</a:t>
-            </a:r>
-          </a:p>
-        </p:txBody>
-      </p:sp>
-      <p:sp>
-        <p:nvSpPr>
-          <p:cNvPr id="57" name="TextBox 56">
-            <a:extLst>
-              <a:ext uri="{FF2B5EF4-FFF2-40B4-BE49-F238E27FC236}">
-                <a16:creationId xmlns:a16="http://schemas.microsoft.com/office/drawing/2014/main" id="{F7D3817F-A237-3548-8945-B1413F1216D8}"/>
-              </a:ext>
-            </a:extLst>
-          </p:cNvPr>
-          <p:cNvSpPr txBox="1"/>
-          <p:nvPr/>
-        </p:nvSpPr>
-        <p:spPr>
-          <a:xfrm>
-            <a:off x="476549" y="8138347"/>
-            <a:ext cx="2576869" cy="584775"/>
-          </a:xfrm>
-          <a:prstGeom prst="rect">
-            <a:avLst/>
-          </a:prstGeom>
-          <a:solidFill>
-            <a:schemeClr val="accent1">
-              <a:lumMod val="20000"/>
-              <a:lumOff val="80000"/>
-            </a:schemeClr>
-          </a:solidFill>
-          <a:ln>
-            <a:solidFill>
-              <a:schemeClr val="tx2"/>
-            </a:solidFill>
-          </a:ln>
-        </p:spPr>
-        <p:txBody>
-          <a:bodyPr wrap="square" rtlCol="0">
-            <a:spAutoFit/>
-          </a:bodyPr>
-          <a:lstStyle/>
-          <a:p>
-            <a:pPr algn="ctr"/>
-            <a:r>
-              <a:rPr lang="en-US" sz="1600" dirty="0">
-                <a:latin typeface="Times New Roman" charset="0"/>
-                <a:ea typeface="Times New Roman" charset="0"/>
-                <a:cs typeface="Times New Roman" charset="0"/>
-              </a:rPr>
-              <a:t>Fertility rate </a:t>
-            </a:r>
-            <a:br>
-              <a:rPr lang="en-US" sz="1600" dirty="0">
-                <a:latin typeface="Times New Roman" charset="0"/>
-                <a:ea typeface="Times New Roman" charset="0"/>
-                <a:cs typeface="Times New Roman" charset="0"/>
-              </a:rPr>
-            </a:br>
-            <a:r>
-              <a:rPr lang="en-US" sz="1600" dirty="0">
-                <a:latin typeface="Times New Roman" charset="0"/>
-                <a:ea typeface="Times New Roman" charset="0"/>
-                <a:cs typeface="Times New Roman" charset="0"/>
-              </a:rPr>
-              <a:t>(n=176 | N= )</a:t>
-            </a:r>
-          </a:p>
-        </p:txBody>
-      </p:sp>
-      <p:cxnSp>
-        <p:nvCxnSpPr>
-          <p:cNvPr id="51" name="Elbow Connector 50">
-            <a:extLst>
-              <a:ext uri="{FF2B5EF4-FFF2-40B4-BE49-F238E27FC236}">
-                <a16:creationId xmlns:a16="http://schemas.microsoft.com/office/drawing/2014/main" id="{406EF1B4-2764-F849-B81B-A1C2CAEDA26B}"/>
-              </a:ext>
-            </a:extLst>
-          </p:cNvPr>
-          <p:cNvCxnSpPr>
-            <a:cxnSpLocks/>
-            <a:stCxn id="15" idx="1"/>
-            <a:endCxn id="57" idx="1"/>
-          </p:cNvCxnSpPr>
-          <p:nvPr/>
-        </p:nvCxnSpPr>
-        <p:spPr>
-          <a:xfrm rot="10800000" flipH="1" flipV="1">
-            <a:off x="425717" y="5355015"/>
-            <a:ext cx="50832" cy="3075719"/>
-          </a:xfrm>
-          <a:prstGeom prst="bentConnector3">
-            <a:avLst>
-              <a:gd name="adj1" fmla="val -449717"/>
-            </a:avLst>
-          </a:prstGeom>
-        </p:spPr>
-        <p:style>
-          <a:lnRef idx="1">
-            <a:schemeClr val="accent1"/>
-          </a:lnRef>
-          <a:fillRef idx="0">
-            <a:schemeClr val="accent1"/>
-          </a:fillRef>
-          <a:effectRef idx="0">
-            <a:schemeClr val="accent1"/>
-          </a:effectRef>
-          <a:fontRef idx="minor">
-            <a:schemeClr val="tx1"/>
-          </a:fontRef>
-        </p:style>
-      </p:cxnSp>
-      <p:cxnSp>
-        <p:nvCxnSpPr>
-          <p:cNvPr id="61" name="Elbow Connector 60">
-            <a:extLst>
-              <a:ext uri="{FF2B5EF4-FFF2-40B4-BE49-F238E27FC236}">
-                <a16:creationId xmlns:a16="http://schemas.microsoft.com/office/drawing/2014/main" id="{08AD2F7F-72E7-A947-AE80-CB13B1DBCBA3}"/>
-              </a:ext>
-            </a:extLst>
-          </p:cNvPr>
-          <p:cNvCxnSpPr>
-            <a:cxnSpLocks/>
-            <a:stCxn id="15" idx="1"/>
-            <a:endCxn id="16" idx="1"/>
-          </p:cNvCxnSpPr>
-          <p:nvPr/>
-        </p:nvCxnSpPr>
-        <p:spPr>
-          <a:xfrm rot="10800000" flipH="1" flipV="1">
-            <a:off x="425717" y="5355016"/>
-            <a:ext cx="25250" cy="1065384"/>
-          </a:xfrm>
-          <a:prstGeom prst="bentConnector3">
-            <a:avLst>
-              <a:gd name="adj1" fmla="val -905347"/>
-            </a:avLst>
-          </a:prstGeom>
-        </p:spPr>
-        <p:style>
-          <a:lnRef idx="1">
-            <a:schemeClr val="accent1"/>
-          </a:lnRef>
-          <a:fillRef idx="0">
-            <a:schemeClr val="accent1"/>
-          </a:fillRef>
-          <a:effectRef idx="0">
-            <a:schemeClr val="accent1"/>
-          </a:effectRef>
-          <a:fontRef idx="minor">
-            <a:schemeClr val="tx1"/>
-          </a:fontRef>
-        </p:style>
-      </p:cxnSp>
-      <p:cxnSp>
-        <p:nvCxnSpPr>
-          <p:cNvPr id="65" name="Elbow Connector 64">
-            <a:extLst>
-              <a:ext uri="{FF2B5EF4-FFF2-40B4-BE49-F238E27FC236}">
-                <a16:creationId xmlns:a16="http://schemas.microsoft.com/office/drawing/2014/main" id="{A041F189-BC08-CB41-A636-6ADA659EFD14}"/>
-              </a:ext>
-            </a:extLst>
-          </p:cNvPr>
-          <p:cNvCxnSpPr>
-            <a:cxnSpLocks/>
-            <a:stCxn id="15" idx="1"/>
-            <a:endCxn id="55" idx="1"/>
-          </p:cNvCxnSpPr>
-          <p:nvPr/>
-        </p:nvCxnSpPr>
-        <p:spPr>
-          <a:xfrm rot="10800000" flipH="1" flipV="1">
-            <a:off x="425717" y="5355015"/>
-            <a:ext cx="25182" cy="1805799"/>
-          </a:xfrm>
-          <a:prstGeom prst="bentConnector3">
-            <a:avLst>
-              <a:gd name="adj1" fmla="val -907791"/>
-            </a:avLst>
-          </a:prstGeom>
-        </p:spPr>
-        <p:style>
-          <a:lnRef idx="1">
-            <a:schemeClr val="accent1"/>
-          </a:lnRef>
-          <a:fillRef idx="0">
-            <a:schemeClr val="accent1"/>
-          </a:fillRef>
-          <a:effectRef idx="0">
-            <a:schemeClr val="accent1"/>
-          </a:effectRef>
-          <a:fontRef idx="minor">
-            <a:schemeClr val="tx1"/>
-          </a:fontRef>
-        </p:style>
-      </p:cxnSp>
-      <p:cxnSp>
-        <p:nvCxnSpPr>
-          <p:cNvPr id="70" name="Elbow Connector 69">
-            <a:extLst>
-              <a:ext uri="{FF2B5EF4-FFF2-40B4-BE49-F238E27FC236}">
-                <a16:creationId xmlns:a16="http://schemas.microsoft.com/office/drawing/2014/main" id="{957BF236-A099-7E46-90EE-0FB200F7E2E3}"/>
-              </a:ext>
-            </a:extLst>
-          </p:cNvPr>
-          <p:cNvCxnSpPr>
-            <a:cxnSpLocks/>
-            <a:stCxn id="15" idx="1"/>
-            <a:endCxn id="56" idx="1"/>
-          </p:cNvCxnSpPr>
-          <p:nvPr/>
-        </p:nvCxnSpPr>
-        <p:spPr>
-          <a:xfrm rot="10800000" flipH="1" flipV="1">
-            <a:off x="425717" y="5355016"/>
-            <a:ext cx="36322" cy="2417122"/>
-          </a:xfrm>
-          <a:prstGeom prst="bentConnector3">
-            <a:avLst>
-              <a:gd name="adj1" fmla="val -629371"/>
-            </a:avLst>
-          </a:prstGeom>
-        </p:spPr>
-        <p:style>
-          <a:lnRef idx="1">
-            <a:schemeClr val="accent1"/>
-          </a:lnRef>
-          <a:fillRef idx="0">
-            <a:schemeClr val="accent1"/>
-          </a:fillRef>
-          <a:effectRef idx="0">
-            <a:schemeClr val="accent1"/>
-          </a:effectRef>
-          <a:fontRef idx="minor">
-            <a:schemeClr val="tx1"/>
-          </a:fontRef>
-        </p:style>
-      </p:cxnSp>
-      <p:cxnSp>
-        <p:nvCxnSpPr>
-          <p:cNvPr id="71" name="Elbow Connector 70">
-            <a:extLst>
-              <a:ext uri="{FF2B5EF4-FFF2-40B4-BE49-F238E27FC236}">
-                <a16:creationId xmlns:a16="http://schemas.microsoft.com/office/drawing/2014/main" id="{E26467B6-149C-D94D-B274-BF98A3DD0E28}"/>
-              </a:ext>
-            </a:extLst>
-          </p:cNvPr>
-          <p:cNvCxnSpPr>
-            <a:cxnSpLocks/>
-            <a:stCxn id="54" idx="1"/>
-            <a:endCxn id="78" idx="1"/>
-          </p:cNvCxnSpPr>
-          <p:nvPr/>
-        </p:nvCxnSpPr>
-        <p:spPr>
-          <a:xfrm rot="10800000" flipV="1">
-            <a:off x="3869988" y="5231905"/>
-            <a:ext cx="6638" cy="1949490"/>
-          </a:xfrm>
-          <a:prstGeom prst="bentConnector3">
-            <a:avLst>
-              <a:gd name="adj1" fmla="val 3801281"/>
-            </a:avLst>
-          </a:prstGeom>
-        </p:spPr>
-        <p:style>
-          <a:lnRef idx="1">
-            <a:schemeClr val="accent1"/>
-          </a:lnRef>
-          <a:fillRef idx="0">
-            <a:schemeClr val="accent1"/>
-          </a:fillRef>
-          <a:effectRef idx="0">
-            <a:schemeClr val="accent1"/>
-          </a:effectRef>
-          <a:fontRef idx="minor">
-            <a:schemeClr val="tx1"/>
-          </a:fontRef>
-        </p:style>
-      </p:cxnSp>
-      <p:cxnSp>
-        <p:nvCxnSpPr>
-          <p:cNvPr id="72" name="Elbow Connector 71">
-            <a:extLst>
-              <a:ext uri="{FF2B5EF4-FFF2-40B4-BE49-F238E27FC236}">
-                <a16:creationId xmlns:a16="http://schemas.microsoft.com/office/drawing/2014/main" id="{BF89F7BC-3157-EA46-B490-7FD27198D062}"/>
-              </a:ext>
-            </a:extLst>
-          </p:cNvPr>
-          <p:cNvCxnSpPr>
-            <a:cxnSpLocks/>
-            <a:stCxn id="54" idx="1"/>
-            <a:endCxn id="75" idx="1"/>
-          </p:cNvCxnSpPr>
-          <p:nvPr/>
-        </p:nvCxnSpPr>
-        <p:spPr>
-          <a:xfrm rot="10800000" flipV="1">
-            <a:off x="3855432" y="5231904"/>
-            <a:ext cx="21194" cy="528479"/>
-          </a:xfrm>
-          <a:prstGeom prst="bentConnector3">
-            <a:avLst>
-              <a:gd name="adj1" fmla="val 1178607"/>
-            </a:avLst>
-          </a:prstGeom>
-        </p:spPr>
-        <p:style>
-          <a:lnRef idx="1">
-            <a:schemeClr val="accent1"/>
-          </a:lnRef>
-          <a:fillRef idx="0">
-            <a:schemeClr val="accent1"/>
-          </a:fillRef>
-          <a:effectRef idx="0">
-            <a:schemeClr val="accent1"/>
-          </a:effectRef>
-          <a:fontRef idx="minor">
-            <a:schemeClr val="tx1"/>
-          </a:fontRef>
-        </p:style>
-      </p:cxnSp>
-      <p:cxnSp>
-        <p:nvCxnSpPr>
-          <p:cNvPr id="74" name="Elbow Connector 73">
-            <a:extLst>
-              <a:ext uri="{FF2B5EF4-FFF2-40B4-BE49-F238E27FC236}">
-                <a16:creationId xmlns:a16="http://schemas.microsoft.com/office/drawing/2014/main" id="{221A28E2-5177-9F4E-AE90-0DEECF753197}"/>
-              </a:ext>
-            </a:extLst>
-          </p:cNvPr>
-          <p:cNvCxnSpPr>
-            <a:cxnSpLocks/>
-            <a:stCxn id="54" idx="1"/>
-            <a:endCxn id="76" idx="1"/>
-          </p:cNvCxnSpPr>
-          <p:nvPr/>
-        </p:nvCxnSpPr>
-        <p:spPr>
-          <a:xfrm rot="10800000" flipV="1">
-            <a:off x="3855432" y="5231904"/>
-            <a:ext cx="21195" cy="1014681"/>
-          </a:xfrm>
-          <a:prstGeom prst="bentConnector3">
-            <a:avLst>
-              <a:gd name="adj1" fmla="val 1178556"/>
-            </a:avLst>
-          </a:prstGeom>
-        </p:spPr>
-        <p:style>
-          <a:lnRef idx="1">
-            <a:schemeClr val="accent1"/>
-          </a:lnRef>
-          <a:fillRef idx="0">
-            <a:schemeClr val="accent1"/>
-          </a:fillRef>
-          <a:effectRef idx="0">
-            <a:schemeClr val="accent1"/>
-          </a:effectRef>
-          <a:fontRef idx="minor">
-            <a:schemeClr val="tx1"/>
-          </a:fontRef>
-        </p:style>
-      </p:cxnSp>
-      <p:sp>
-        <p:nvSpPr>
-          <p:cNvPr id="75" name="TextBox 74">
-            <a:extLst>
-              <a:ext uri="{FF2B5EF4-FFF2-40B4-BE49-F238E27FC236}">
-                <a16:creationId xmlns:a16="http://schemas.microsoft.com/office/drawing/2014/main" id="{AA00240C-F7A4-D440-9BBB-4C9CC24696D8}"/>
-              </a:ext>
-            </a:extLst>
-          </p:cNvPr>
-          <p:cNvSpPr txBox="1"/>
-          <p:nvPr/>
-        </p:nvSpPr>
-        <p:spPr>
-          <a:xfrm>
-            <a:off x="3855432" y="5591107"/>
-            <a:ext cx="2576869" cy="338554"/>
-          </a:xfrm>
-          <a:prstGeom prst="rect">
-            <a:avLst/>
-          </a:prstGeom>
-          <a:solidFill>
-            <a:schemeClr val="accent2">
-              <a:lumMod val="20000"/>
-              <a:lumOff val="80000"/>
-            </a:schemeClr>
-          </a:solidFill>
-          <a:ln>
-            <a:solidFill>
-              <a:schemeClr val="tx2"/>
-            </a:solidFill>
-          </a:ln>
-        </p:spPr>
-        <p:txBody>
-          <a:bodyPr wrap="square" rtlCol="0">
-            <a:spAutoFit/>
-          </a:bodyPr>
-          <a:lstStyle/>
-          <a:p>
-            <a:pPr algn="ctr"/>
-            <a:r>
-              <a:rPr lang="en-US" sz="1600" dirty="0">
-                <a:latin typeface="Times New Roman" charset="0"/>
-                <a:ea typeface="Times New Roman" charset="0"/>
-                <a:cs typeface="Times New Roman" charset="0"/>
-              </a:rPr>
-              <a:t>Education level (80)</a:t>
-            </a:r>
-          </a:p>
-        </p:txBody>
-      </p:sp>
-      <p:sp>
-        <p:nvSpPr>
-          <p:cNvPr id="76" name="TextBox 75">
-            <a:extLst>
-              <a:ext uri="{FF2B5EF4-FFF2-40B4-BE49-F238E27FC236}">
-                <a16:creationId xmlns:a16="http://schemas.microsoft.com/office/drawing/2014/main" id="{8B99339D-0B52-574C-AB22-F81E92A78C3B}"/>
-              </a:ext>
-            </a:extLst>
-          </p:cNvPr>
-          <p:cNvSpPr txBox="1"/>
-          <p:nvPr/>
-        </p:nvSpPr>
-        <p:spPr>
-          <a:xfrm>
-            <a:off x="3855431" y="6077309"/>
-            <a:ext cx="2576869" cy="338554"/>
-          </a:xfrm>
-          <a:prstGeom prst="rect">
-            <a:avLst/>
-          </a:prstGeom>
-          <a:solidFill>
-            <a:schemeClr val="accent6">
-              <a:lumMod val="20000"/>
-              <a:lumOff val="80000"/>
-            </a:schemeClr>
-          </a:solidFill>
-          <a:ln>
-            <a:solidFill>
-              <a:schemeClr val="tx2"/>
-            </a:solidFill>
-          </a:ln>
-        </p:spPr>
-        <p:txBody>
-          <a:bodyPr wrap="square" rtlCol="0">
-            <a:spAutoFit/>
-          </a:bodyPr>
-          <a:lstStyle/>
-          <a:p>
-            <a:pPr algn="ctr"/>
-            <a:r>
-              <a:rPr lang="en-US" sz="1600" dirty="0">
-                <a:latin typeface="Times New Roman" charset="0"/>
-                <a:ea typeface="Times New Roman" charset="0"/>
-                <a:cs typeface="Times New Roman" charset="0"/>
-              </a:rPr>
-              <a:t>SES (102)</a:t>
-            </a:r>
-          </a:p>
-        </p:txBody>
-      </p:sp>
-      <p:sp>
-        <p:nvSpPr>
-          <p:cNvPr id="77" name="TextBox 76">
-            <a:extLst>
-              <a:ext uri="{FF2B5EF4-FFF2-40B4-BE49-F238E27FC236}">
-                <a16:creationId xmlns:a16="http://schemas.microsoft.com/office/drawing/2014/main" id="{067D55C2-FA4D-A549-97E7-BD4E1523AEF4}"/>
-              </a:ext>
-            </a:extLst>
-          </p:cNvPr>
-          <p:cNvSpPr txBox="1"/>
-          <p:nvPr/>
-        </p:nvSpPr>
-        <p:spPr>
-          <a:xfrm>
-            <a:off x="3855429" y="6508565"/>
-            <a:ext cx="2576869" cy="338554"/>
-          </a:xfrm>
-          <a:prstGeom prst="rect">
-            <a:avLst/>
-          </a:prstGeom>
-          <a:solidFill>
-            <a:schemeClr val="accent6">
-              <a:lumMod val="20000"/>
-              <a:lumOff val="80000"/>
-            </a:schemeClr>
-          </a:solidFill>
-          <a:ln>
-            <a:solidFill>
-              <a:schemeClr val="tx2"/>
-            </a:solidFill>
-          </a:ln>
-        </p:spPr>
-        <p:txBody>
-          <a:bodyPr wrap="square" rtlCol="0">
-            <a:spAutoFit/>
-          </a:bodyPr>
-          <a:lstStyle/>
-          <a:p>
-            <a:pPr algn="ctr"/>
-            <a:r>
-              <a:rPr lang="en-US" sz="1600" dirty="0">
-                <a:latin typeface="Times New Roman" charset="0"/>
-                <a:ea typeface="Times New Roman" charset="0"/>
-                <a:cs typeface="Times New Roman" charset="0"/>
-              </a:rPr>
-              <a:t>Profession (99)</a:t>
-            </a:r>
-          </a:p>
-        </p:txBody>
-      </p:sp>
-      <p:sp>
-        <p:nvSpPr>
-          <p:cNvPr id="78" name="TextBox 77">
-            <a:extLst>
-              <a:ext uri="{FF2B5EF4-FFF2-40B4-BE49-F238E27FC236}">
-                <a16:creationId xmlns:a16="http://schemas.microsoft.com/office/drawing/2014/main" id="{45B90022-24CD-D149-BBF8-540934879267}"/>
-              </a:ext>
-            </a:extLst>
-          </p:cNvPr>
-          <p:cNvSpPr txBox="1"/>
-          <p:nvPr/>
-        </p:nvSpPr>
-        <p:spPr>
-          <a:xfrm>
-            <a:off x="3869988" y="7012118"/>
-            <a:ext cx="2576869" cy="338554"/>
-          </a:xfrm>
-          <a:prstGeom prst="rect">
-            <a:avLst/>
-          </a:prstGeom>
-          <a:solidFill>
-            <a:schemeClr val="accent1">
-              <a:lumMod val="20000"/>
-              <a:lumOff val="80000"/>
-            </a:schemeClr>
-          </a:solidFill>
-          <a:ln>
-            <a:solidFill>
-              <a:schemeClr val="tx2"/>
-            </a:solidFill>
-          </a:ln>
-        </p:spPr>
-        <p:txBody>
-          <a:bodyPr wrap="square" rtlCol="0">
-            <a:spAutoFit/>
-          </a:bodyPr>
-          <a:lstStyle/>
-          <a:p>
-            <a:pPr algn="ctr"/>
-            <a:r>
-              <a:rPr lang="en-US" sz="1600" dirty="0">
-                <a:latin typeface="Times New Roman" charset="0"/>
-                <a:ea typeface="Times New Roman" charset="0"/>
-                <a:cs typeface="Times New Roman" charset="0"/>
-              </a:rPr>
-              <a:t>Family Structure (68)</a:t>
-            </a:r>
-          </a:p>
-        </p:txBody>
-      </p:sp>
-      <p:sp>
-        <p:nvSpPr>
-          <p:cNvPr id="79" name="TextBox 78">
-            <a:extLst>
-              <a:ext uri="{FF2B5EF4-FFF2-40B4-BE49-F238E27FC236}">
-                <a16:creationId xmlns:a16="http://schemas.microsoft.com/office/drawing/2014/main" id="{62EC4979-70C9-7549-8A41-7E63692E51E2}"/>
-              </a:ext>
-            </a:extLst>
-          </p:cNvPr>
-          <p:cNvSpPr txBox="1"/>
-          <p:nvPr/>
-        </p:nvSpPr>
-        <p:spPr>
-          <a:xfrm>
-            <a:off x="3855430" y="7460725"/>
-            <a:ext cx="2921385" cy="338554"/>
-          </a:xfrm>
-          <a:prstGeom prst="rect">
-            <a:avLst/>
-          </a:prstGeom>
-          <a:solidFill>
-            <a:schemeClr val="accent1">
-              <a:lumMod val="20000"/>
-              <a:lumOff val="80000"/>
-            </a:schemeClr>
-          </a:solidFill>
-          <a:ln>
-            <a:solidFill>
-              <a:schemeClr val="tx2"/>
-            </a:solidFill>
-          </a:ln>
-        </p:spPr>
-        <p:txBody>
-          <a:bodyPr wrap="square" rtlCol="0">
-            <a:spAutoFit/>
-          </a:bodyPr>
-          <a:lstStyle/>
-          <a:p>
-            <a:pPr algn="ctr"/>
-            <a:r>
-              <a:rPr lang="en-US" sz="1600" dirty="0">
-                <a:latin typeface="Times New Roman" charset="0"/>
-                <a:ea typeface="Times New Roman" charset="0"/>
-                <a:cs typeface="Times New Roman" charset="0"/>
-              </a:rPr>
-              <a:t>% children with sibling(s) (93)</a:t>
-            </a:r>
-          </a:p>
-        </p:txBody>
-      </p:sp>
-      <p:cxnSp>
-        <p:nvCxnSpPr>
-          <p:cNvPr id="97" name="Elbow Connector 96">
-            <a:extLst>
-              <a:ext uri="{FF2B5EF4-FFF2-40B4-BE49-F238E27FC236}">
-                <a16:creationId xmlns:a16="http://schemas.microsoft.com/office/drawing/2014/main" id="{81FB9333-8445-B049-80A8-C66EC2AEE0CF}"/>
-              </a:ext>
-            </a:extLst>
-          </p:cNvPr>
-          <p:cNvCxnSpPr>
-            <a:cxnSpLocks/>
-            <a:stCxn id="54" idx="1"/>
-            <a:endCxn id="77" idx="1"/>
-          </p:cNvCxnSpPr>
-          <p:nvPr/>
-        </p:nvCxnSpPr>
-        <p:spPr>
-          <a:xfrm rot="10800000" flipV="1">
-            <a:off x="3855430" y="5231904"/>
-            <a:ext cx="21197" cy="1445937"/>
-          </a:xfrm>
-          <a:prstGeom prst="bentConnector3">
-            <a:avLst>
-              <a:gd name="adj1" fmla="val 1178454"/>
-            </a:avLst>
-          </a:prstGeom>
-        </p:spPr>
-        <p:style>
-          <a:lnRef idx="1">
-            <a:schemeClr val="accent1"/>
-          </a:lnRef>
-          <a:fillRef idx="0">
-            <a:schemeClr val="accent1"/>
-          </a:fillRef>
-          <a:effectRef idx="0">
-            <a:schemeClr val="accent1"/>
-          </a:effectRef>
-          <a:fontRef idx="minor">
-            <a:schemeClr val="tx1"/>
-          </a:fontRef>
-        </p:style>
-      </p:cxnSp>
-      <p:cxnSp>
-        <p:nvCxnSpPr>
-          <p:cNvPr id="100" name="Elbow Connector 99">
-            <a:extLst>
-              <a:ext uri="{FF2B5EF4-FFF2-40B4-BE49-F238E27FC236}">
-                <a16:creationId xmlns:a16="http://schemas.microsoft.com/office/drawing/2014/main" id="{FB99E578-42E0-704D-ADFA-FFC2C3B55492}"/>
-              </a:ext>
-            </a:extLst>
-          </p:cNvPr>
-          <p:cNvCxnSpPr>
-            <a:cxnSpLocks/>
-            <a:stCxn id="54" idx="1"/>
-            <a:endCxn id="79" idx="1"/>
-          </p:cNvCxnSpPr>
-          <p:nvPr/>
-        </p:nvCxnSpPr>
-        <p:spPr>
-          <a:xfrm rot="10800000" flipV="1">
-            <a:off x="3855430" y="5231904"/>
-            <a:ext cx="21196" cy="2398097"/>
-          </a:xfrm>
-          <a:prstGeom prst="bentConnector3">
-            <a:avLst>
-              <a:gd name="adj1" fmla="val 1178505"/>
-            </a:avLst>
-          </a:prstGeom>
-        </p:spPr>
-        <p:style>
-          <a:lnRef idx="1">
-            <a:schemeClr val="accent1"/>
-          </a:lnRef>
-          <a:fillRef idx="0">
-            <a:schemeClr val="accent1"/>
-          </a:fillRef>
-          <a:effectRef idx="0">
-            <a:schemeClr val="accent1"/>
-          </a:effectRef>
-          <a:fontRef idx="minor">
-            <a:schemeClr val="tx1"/>
-          </a:fontRef>
-        </p:style>
-      </p:cxnSp>
-      <p:sp>
-        <p:nvSpPr>
-          <p:cNvPr id="104" name="TextBox 103">
-            <a:extLst>
-              <a:ext uri="{FF2B5EF4-FFF2-40B4-BE49-F238E27FC236}">
-                <a16:creationId xmlns:a16="http://schemas.microsoft.com/office/drawing/2014/main" id="{2471627D-70C1-5D49-AFC1-0FFD573B2B60}"/>
-              </a:ext>
-            </a:extLst>
-          </p:cNvPr>
-          <p:cNvSpPr txBox="1"/>
-          <p:nvPr/>
-        </p:nvSpPr>
-        <p:spPr>
-          <a:xfrm>
-            <a:off x="3855426" y="8300123"/>
-            <a:ext cx="2921385" cy="338554"/>
-          </a:xfrm>
-          <a:prstGeom prst="rect">
-            <a:avLst/>
-          </a:prstGeom>
-          <a:solidFill>
-            <a:srgbClr val="FFEAFF"/>
-          </a:solidFill>
-          <a:ln>
-            <a:solidFill>
-              <a:schemeClr val="tx2"/>
-            </a:solidFill>
-          </a:ln>
-        </p:spPr>
-        <p:txBody>
-          <a:bodyPr wrap="square" rtlCol="0">
-            <a:spAutoFit/>
-          </a:bodyPr>
-          <a:lstStyle/>
-          <a:p>
-            <a:pPr algn="ctr"/>
-            <a:r>
-              <a:rPr lang="en-US" sz="1600" dirty="0">
-                <a:latin typeface="Times New Roman" charset="0"/>
-                <a:ea typeface="Times New Roman" charset="0"/>
-                <a:cs typeface="Times New Roman" charset="0"/>
-              </a:rPr>
-              <a:t>Language spoken (180)</a:t>
-            </a:r>
-          </a:p>
-        </p:txBody>
-      </p:sp>
-      <p:sp>
-        <p:nvSpPr>
-          <p:cNvPr id="105" name="TextBox 104">
-            <a:extLst>
-              <a:ext uri="{FF2B5EF4-FFF2-40B4-BE49-F238E27FC236}">
-                <a16:creationId xmlns:a16="http://schemas.microsoft.com/office/drawing/2014/main" id="{10FE8287-EC78-C942-95E4-7A6D5E62D392}"/>
-              </a:ext>
-            </a:extLst>
-          </p:cNvPr>
-          <p:cNvSpPr txBox="1"/>
-          <p:nvPr/>
-        </p:nvSpPr>
-        <p:spPr>
-          <a:xfrm>
-            <a:off x="3855426" y="8749684"/>
-            <a:ext cx="2921385" cy="338554"/>
-          </a:xfrm>
-          <a:prstGeom prst="rect">
-            <a:avLst/>
-          </a:prstGeom>
-          <a:solidFill>
-            <a:srgbClr val="FFEAFF"/>
-          </a:solidFill>
-          <a:ln>
-            <a:solidFill>
-              <a:schemeClr val="tx2"/>
-            </a:solidFill>
-          </a:ln>
-        </p:spPr>
-        <p:txBody>
-          <a:bodyPr wrap="square" rtlCol="0">
-            <a:spAutoFit/>
-          </a:bodyPr>
-          <a:lstStyle/>
-          <a:p>
-            <a:pPr algn="ctr"/>
-            <a:r>
-              <a:rPr lang="en-US" sz="1600" dirty="0">
-                <a:latin typeface="Times New Roman" charset="0"/>
-                <a:ea typeface="Times New Roman" charset="0"/>
-                <a:cs typeface="Times New Roman" charset="0"/>
-              </a:rPr>
-              <a:t>Monolingualism? (110)</a:t>
-            </a:r>
-          </a:p>
-        </p:txBody>
-      </p:sp>
-      <p:sp>
-        <p:nvSpPr>
-          <p:cNvPr id="106" name="TextBox 105">
-            <a:extLst>
-              <a:ext uri="{FF2B5EF4-FFF2-40B4-BE49-F238E27FC236}">
-                <a16:creationId xmlns:a16="http://schemas.microsoft.com/office/drawing/2014/main" id="{19338C17-3190-384E-986C-94A49F6E1ECE}"/>
-              </a:ext>
-            </a:extLst>
-          </p:cNvPr>
-          <p:cNvSpPr txBox="1"/>
-          <p:nvPr/>
-        </p:nvSpPr>
-        <p:spPr>
-          <a:xfrm>
-            <a:off x="3855427" y="9178264"/>
-            <a:ext cx="2921385" cy="338554"/>
-          </a:xfrm>
-          <a:prstGeom prst="rect">
-            <a:avLst/>
-          </a:prstGeom>
-          <a:solidFill>
-            <a:schemeClr val="accent4">
-              <a:lumMod val="20000"/>
-              <a:lumOff val="80000"/>
-            </a:schemeClr>
-          </a:solidFill>
-          <a:ln>
-            <a:solidFill>
-              <a:schemeClr val="tx2"/>
-            </a:solidFill>
-          </a:ln>
-        </p:spPr>
-        <p:txBody>
-          <a:bodyPr wrap="square" rtlCol="0">
-            <a:spAutoFit/>
-          </a:bodyPr>
-          <a:lstStyle/>
-          <a:p>
-            <a:pPr algn="ctr"/>
-            <a:r>
-              <a:rPr lang="en-US" sz="1600" dirty="0">
-                <a:latin typeface="Times New Roman" charset="0"/>
-                <a:ea typeface="Times New Roman" charset="0"/>
-                <a:cs typeface="Times New Roman" charset="0"/>
-              </a:rPr>
-              <a:t>Type of community (65)</a:t>
-            </a:r>
-          </a:p>
-        </p:txBody>
-      </p:sp>
-      <p:sp>
-        <p:nvSpPr>
-          <p:cNvPr id="107" name="TextBox 106">
-            <a:extLst>
-              <a:ext uri="{FF2B5EF4-FFF2-40B4-BE49-F238E27FC236}">
-                <a16:creationId xmlns:a16="http://schemas.microsoft.com/office/drawing/2014/main" id="{BB95F858-9AFC-3B43-83D4-02E620F12841}"/>
-              </a:ext>
-            </a:extLst>
-          </p:cNvPr>
-          <p:cNvSpPr txBox="1"/>
-          <p:nvPr/>
-        </p:nvSpPr>
-        <p:spPr>
-          <a:xfrm>
-            <a:off x="3855425" y="7861053"/>
-            <a:ext cx="2921385" cy="338554"/>
-          </a:xfrm>
-          <a:prstGeom prst="rect">
-            <a:avLst/>
-          </a:prstGeom>
-          <a:solidFill>
-            <a:schemeClr val="accent1">
-              <a:lumMod val="20000"/>
-              <a:lumOff val="80000"/>
-            </a:schemeClr>
-          </a:solidFill>
-          <a:ln>
-            <a:solidFill>
-              <a:schemeClr val="tx2"/>
-            </a:solidFill>
-          </a:ln>
-        </p:spPr>
-        <p:txBody>
-          <a:bodyPr wrap="square" rtlCol="0">
-            <a:spAutoFit/>
-          </a:bodyPr>
-          <a:lstStyle/>
-          <a:p>
-            <a:pPr algn="ctr"/>
-            <a:r>
-              <a:rPr lang="en-US" sz="1600" dirty="0" err="1">
-                <a:latin typeface="Times New Roman" charset="0"/>
-                <a:ea typeface="Times New Roman" charset="0"/>
-                <a:cs typeface="Times New Roman" charset="0"/>
-              </a:rPr>
-              <a:t>Avg</a:t>
-            </a:r>
-            <a:r>
-              <a:rPr lang="en-US" sz="1600" dirty="0">
-                <a:latin typeface="Times New Roman" charset="0"/>
-                <a:ea typeface="Times New Roman" charset="0"/>
-                <a:cs typeface="Times New Roman" charset="0"/>
-              </a:rPr>
-              <a:t> number of children (83)</a:t>
-            </a:r>
-          </a:p>
-        </p:txBody>
-      </p:sp>
-      <p:cxnSp>
-        <p:nvCxnSpPr>
-          <p:cNvPr id="108" name="Elbow Connector 107">
-            <a:extLst>
-              <a:ext uri="{FF2B5EF4-FFF2-40B4-BE49-F238E27FC236}">
-                <a16:creationId xmlns:a16="http://schemas.microsoft.com/office/drawing/2014/main" id="{12725E64-DB58-8543-A14D-AD551F93C33B}"/>
-              </a:ext>
-            </a:extLst>
-          </p:cNvPr>
-          <p:cNvCxnSpPr>
-            <a:cxnSpLocks/>
-            <a:stCxn id="54" idx="1"/>
-            <a:endCxn id="107" idx="1"/>
-          </p:cNvCxnSpPr>
-          <p:nvPr/>
-        </p:nvCxnSpPr>
-        <p:spPr>
-          <a:xfrm rot="10800000" flipV="1">
-            <a:off x="3855426" y="5231904"/>
-            <a:ext cx="21201" cy="2798425"/>
-          </a:xfrm>
-          <a:prstGeom prst="bentConnector3">
-            <a:avLst>
-              <a:gd name="adj1" fmla="val 1178251"/>
-            </a:avLst>
-          </a:prstGeom>
-        </p:spPr>
-        <p:style>
-          <a:lnRef idx="1">
-            <a:schemeClr val="accent1"/>
-          </a:lnRef>
-          <a:fillRef idx="0">
-            <a:schemeClr val="accent1"/>
-          </a:fillRef>
-          <a:effectRef idx="0">
-            <a:schemeClr val="accent1"/>
-          </a:effectRef>
-          <a:fontRef idx="minor">
-            <a:schemeClr val="tx1"/>
-          </a:fontRef>
-        </p:style>
-      </p:cxnSp>
-      <p:cxnSp>
-        <p:nvCxnSpPr>
-          <p:cNvPr id="111" name="Elbow Connector 110">
-            <a:extLst>
-              <a:ext uri="{FF2B5EF4-FFF2-40B4-BE49-F238E27FC236}">
-                <a16:creationId xmlns:a16="http://schemas.microsoft.com/office/drawing/2014/main" id="{A18719B4-D735-934B-B105-178C7B7AB191}"/>
-              </a:ext>
-            </a:extLst>
-          </p:cNvPr>
-          <p:cNvCxnSpPr>
-            <a:cxnSpLocks/>
-            <a:stCxn id="54" idx="1"/>
-            <a:endCxn id="104" idx="1"/>
-          </p:cNvCxnSpPr>
-          <p:nvPr/>
-        </p:nvCxnSpPr>
-        <p:spPr>
-          <a:xfrm rot="10800000" flipV="1">
-            <a:off x="3855426" y="5231904"/>
-            <a:ext cx="21200" cy="3237495"/>
-          </a:xfrm>
-          <a:prstGeom prst="bentConnector3">
-            <a:avLst>
-              <a:gd name="adj1" fmla="val 1178302"/>
-            </a:avLst>
-          </a:prstGeom>
-        </p:spPr>
-        <p:style>
-          <a:lnRef idx="1">
-            <a:schemeClr val="accent1"/>
-          </a:lnRef>
-          <a:fillRef idx="0">
-            <a:schemeClr val="accent1"/>
-          </a:fillRef>
-          <a:effectRef idx="0">
-            <a:schemeClr val="accent1"/>
-          </a:effectRef>
-          <a:fontRef idx="minor">
-            <a:schemeClr val="tx1"/>
-          </a:fontRef>
-        </p:style>
-      </p:cxnSp>
-      <p:cxnSp>
-        <p:nvCxnSpPr>
-          <p:cNvPr id="114" name="Elbow Connector 113">
-            <a:extLst>
-              <a:ext uri="{FF2B5EF4-FFF2-40B4-BE49-F238E27FC236}">
-                <a16:creationId xmlns:a16="http://schemas.microsoft.com/office/drawing/2014/main" id="{EC46E310-27D9-6B41-816E-06F7B259D4B0}"/>
-              </a:ext>
-            </a:extLst>
-          </p:cNvPr>
-          <p:cNvCxnSpPr>
-            <a:cxnSpLocks/>
-            <a:stCxn id="54" idx="1"/>
-            <a:endCxn id="105" idx="1"/>
-          </p:cNvCxnSpPr>
-          <p:nvPr/>
-        </p:nvCxnSpPr>
-        <p:spPr>
-          <a:xfrm rot="10800000" flipV="1">
-            <a:off x="3855426" y="5231905"/>
-            <a:ext cx="21200" cy="3687056"/>
-          </a:xfrm>
-          <a:prstGeom prst="bentConnector3">
-            <a:avLst>
-              <a:gd name="adj1" fmla="val 1178302"/>
-            </a:avLst>
-          </a:prstGeom>
-        </p:spPr>
-        <p:style>
-          <a:lnRef idx="1">
-            <a:schemeClr val="accent1"/>
-          </a:lnRef>
-          <a:fillRef idx="0">
-            <a:schemeClr val="accent1"/>
-          </a:fillRef>
-          <a:effectRef idx="0">
-            <a:schemeClr val="accent1"/>
-          </a:effectRef>
-          <a:fontRef idx="minor">
-            <a:schemeClr val="tx1"/>
-          </a:fontRef>
-        </p:style>
-      </p:cxnSp>
-      <p:cxnSp>
-        <p:nvCxnSpPr>
-          <p:cNvPr id="117" name="Elbow Connector 116">
-            <a:extLst>
-              <a:ext uri="{FF2B5EF4-FFF2-40B4-BE49-F238E27FC236}">
-                <a16:creationId xmlns:a16="http://schemas.microsoft.com/office/drawing/2014/main" id="{520BBC86-7492-3949-9B30-FAD8571E54BD}"/>
-              </a:ext>
-            </a:extLst>
-          </p:cNvPr>
-          <p:cNvCxnSpPr>
-            <a:cxnSpLocks/>
-            <a:stCxn id="54" idx="1"/>
-            <a:endCxn id="106" idx="1"/>
-          </p:cNvCxnSpPr>
-          <p:nvPr/>
-        </p:nvCxnSpPr>
-        <p:spPr>
-          <a:xfrm rot="10800000" flipV="1">
-            <a:off x="3855428" y="5231905"/>
-            <a:ext cx="21199" cy="4115636"/>
-          </a:xfrm>
-          <a:prstGeom prst="bentConnector3">
-            <a:avLst>
-              <a:gd name="adj1" fmla="val 1178353"/>
-            </a:avLst>
-          </a:prstGeom>
-        </p:spPr>
-        <p:style>
-          <a:lnRef idx="1">
-            <a:schemeClr val="accent1"/>
-          </a:lnRef>
-          <a:fillRef idx="0">
-            <a:schemeClr val="accent1"/>
-          </a:fillRef>
-          <a:effectRef idx="0">
-            <a:schemeClr val="accent1"/>
-          </a:effectRef>
-          <a:fontRef idx="minor">
-            <a:schemeClr val="tx1"/>
-          </a:fontRef>
-        </p:style>
-      </p:cxnSp>
-      <p:cxnSp>
-        <p:nvCxnSpPr>
-          <p:cNvPr id="40" name="Straight Arrow Connector 39">
-            <a:extLst>
-              <a:ext uri="{FF2B5EF4-FFF2-40B4-BE49-F238E27FC236}">
-                <a16:creationId xmlns:a16="http://schemas.microsoft.com/office/drawing/2014/main" id="{88F73B9E-3A4F-C142-B065-223BA985E392}"/>
-              </a:ext>
-            </a:extLst>
-          </p:cNvPr>
-          <p:cNvCxnSpPr>
-            <a:cxnSpLocks/>
-            <a:stCxn id="14" idx="2"/>
-            <a:endCxn id="54" idx="0"/>
-          </p:cNvCxnSpPr>
-          <p:nvPr/>
-        </p:nvCxnSpPr>
-        <p:spPr>
-          <a:xfrm>
-            <a:off x="1641336" y="4199167"/>
-            <a:ext cx="3517086" cy="740350"/>
-          </a:xfrm>
-          <a:prstGeom prst="straightConnector1">
-            <a:avLst/>
-          </a:prstGeom>
-          <a:ln>
-            <a:tailEnd type="triangle"/>
-          </a:ln>
-        </p:spPr>
-        <p:style>
-          <a:lnRef idx="1">
-            <a:schemeClr val="accent1"/>
-          </a:lnRef>
-          <a:fillRef idx="0">
-            <a:schemeClr val="accent1"/>
-          </a:fillRef>
-          <a:effectRef idx="0">
-            <a:schemeClr val="accent1"/>
-          </a:effectRef>
-          <a:fontRef idx="minor">
-            <a:schemeClr val="tx1"/>
-          </a:fontRef>
-        </p:style>
-      </p:cxnSp>
-      <p:sp>
-        <p:nvSpPr>
-          <p:cNvPr id="44" name="TextBox 43">
-            <a:extLst>
-              <a:ext uri="{FF2B5EF4-FFF2-40B4-BE49-F238E27FC236}">
-                <a16:creationId xmlns:a16="http://schemas.microsoft.com/office/drawing/2014/main" id="{4F87EC74-D9AA-724B-A6CE-6D481D4E1B13}"/>
-              </a:ext>
-            </a:extLst>
-          </p:cNvPr>
-          <p:cNvSpPr txBox="1"/>
-          <p:nvPr/>
-        </p:nvSpPr>
-        <p:spPr>
-          <a:xfrm>
-            <a:off x="476549" y="8846232"/>
-            <a:ext cx="2576869" cy="584775"/>
-          </a:xfrm>
-          <a:prstGeom prst="rect">
-            <a:avLst/>
-          </a:prstGeom>
-          <a:solidFill>
-            <a:srgbClr val="FF40FF">
-              <a:alpha val="12157"/>
-            </a:srgbClr>
-          </a:solidFill>
-          <a:ln>
-            <a:solidFill>
-              <a:schemeClr val="tx2"/>
-            </a:solidFill>
-          </a:ln>
-        </p:spPr>
-        <p:txBody>
-          <a:bodyPr wrap="square" rtlCol="0">
-            <a:spAutoFit/>
-          </a:bodyPr>
-          <a:lstStyle/>
-          <a:p>
-            <a:pPr algn="ctr"/>
-            <a:r>
-              <a:rPr lang="en-US" sz="1600" dirty="0">
-                <a:latin typeface="Times New Roman" charset="0"/>
-                <a:ea typeface="Times New Roman" charset="0"/>
-                <a:cs typeface="Times New Roman" charset="0"/>
-              </a:rPr>
-              <a:t>Language?</a:t>
-            </a:r>
-            <a:br>
-              <a:rPr lang="en-US" sz="1600" dirty="0">
-                <a:latin typeface="Times New Roman" charset="0"/>
-                <a:ea typeface="Times New Roman" charset="0"/>
-                <a:cs typeface="Times New Roman" charset="0"/>
-              </a:rPr>
-            </a:br>
-            <a:r>
-              <a:rPr lang="en-US" sz="1600" dirty="0">
-                <a:latin typeface="Times New Roman" charset="0"/>
-                <a:ea typeface="Times New Roman" charset="0"/>
-                <a:cs typeface="Times New Roman" charset="0"/>
-              </a:rPr>
-              <a:t>(n=180 | N=49 )</a:t>
-            </a:r>
-          </a:p>
-        </p:txBody>
-      </p:sp>
-      <p:cxnSp>
-        <p:nvCxnSpPr>
-          <p:cNvPr id="45" name="Elbow Connector 44">
-            <a:extLst>
-              <a:ext uri="{FF2B5EF4-FFF2-40B4-BE49-F238E27FC236}">
-                <a16:creationId xmlns:a16="http://schemas.microsoft.com/office/drawing/2014/main" id="{0ADBB5B1-10E6-A442-BE2E-8B14CF031CA8}"/>
-              </a:ext>
-            </a:extLst>
-          </p:cNvPr>
-          <p:cNvCxnSpPr>
-            <a:cxnSpLocks/>
-            <a:stCxn id="15" idx="1"/>
-            <a:endCxn id="44" idx="1"/>
-          </p:cNvCxnSpPr>
-          <p:nvPr/>
-        </p:nvCxnSpPr>
-        <p:spPr>
-          <a:xfrm rot="10800000" flipH="1" flipV="1">
-            <a:off x="425717" y="5355016"/>
-            <a:ext cx="50832" cy="3783604"/>
-          </a:xfrm>
-          <a:prstGeom prst="bentConnector3">
-            <a:avLst>
-              <a:gd name="adj1" fmla="val -449717"/>
-            </a:avLst>
-          </a:prstGeom>
         </p:spPr>
         <p:style>
           <a:lnRef idx="1">
@@ -5133,9 +3615,9 @@
 </file>
 
 <file path=ppt/theme/theme1.xml><?xml version="1.0" encoding="utf-8"?>
-<a:theme xmlns:a="http://schemas.openxmlformats.org/drawingml/2006/main" name="Office Theme">
+<a:theme xmlns:a="http://schemas.openxmlformats.org/drawingml/2006/main" name="Office 2013 - 2022 Theme">
   <a:themeElements>
-    <a:clrScheme name="Office Theme">
+    <a:clrScheme name="Office 2013 - 2022 Theme">
       <a:dk1>
         <a:sysClr val="windowText" lastClr="000000"/>
       </a:dk1>
@@ -5173,7 +3655,7 @@
         <a:srgbClr val="954F72"/>
       </a:folHlink>
     </a:clrScheme>
-    <a:fontScheme name="Office Theme">
+    <a:fontScheme name="Office 2013 - 2022 Theme">
       <a:majorFont>
         <a:latin typeface="Calibri Light" panose="020F0302020204030204"/>
         <a:ea typeface=""/>
@@ -5245,7 +3727,7 @@
         <a:font script="Geor" typeface="Sylfaen"/>
       </a:minorFont>
     </a:fontScheme>
-    <a:fmtScheme name="Office Theme">
+    <a:fmtScheme name="Office 2013 - 2022 Theme">
       <a:fillStyleLst>
         <a:solidFill>
           <a:schemeClr val="phClr"/>
@@ -5387,7 +3869,7 @@
   <a:extraClrSchemeLst/>
   <a:extLst>
     <a:ext uri="{05A4C25C-085E-4340-85A3-A5531E510DB2}">
-      <thm15:themeFamily xmlns:thm15="http://schemas.microsoft.com/office/thememl/2012/main" name="Office Theme" id="{62F939B6-93AF-4DB8-9C6B-D6C7DFDC589F}" vid="{4A3C46E8-61CC-4603-A589-7422A47A8E4A}"/>
+      <thm15:themeFamily xmlns:thm15="http://schemas.microsoft.com/office/thememl/2012/main" name="Office 2013 - 2022 Theme" id="{62F939B6-93AF-4DB8-9C6B-D6C7DFDC589F}" vid="{4A3C46E8-61CC-4603-A589-7422A47A8E4A}"/>
     </a:ext>
   </a:extLst>
 </a:theme>

</xml_diff>